<commit_message>
finished the final project
</commit_message>
<xml_diff>
--- a/pysal/contrib/points/tests/Final_project.pptx
+++ b/pysal/contrib/points/tests/Final_project.pptx
@@ -4,6 +4,9 @@
   <p:sldMasterIdLst>
     <p:sldMasterId id="2147483897" r:id="rId1"/>
   </p:sldMasterIdLst>
+  <p:notesMasterIdLst>
+    <p:notesMasterId r:id="rId16"/>
+  </p:notesMasterIdLst>
   <p:sldIdLst>
     <p:sldId id="256" r:id="rId2"/>
     <p:sldId id="257" r:id="rId3"/>
@@ -14,6 +17,11 @@
     <p:sldId id="262" r:id="rId8"/>
     <p:sldId id="263" r:id="rId9"/>
     <p:sldId id="264" r:id="rId10"/>
+    <p:sldId id="265" r:id="rId11"/>
+    <p:sldId id="266" r:id="rId12"/>
+    <p:sldId id="267" r:id="rId13"/>
+    <p:sldId id="268" r:id="rId14"/>
+    <p:sldId id="270" r:id="rId15"/>
   </p:sldIdLst>
   <p:sldSz cx="9144000" cy="6858000" type="screen4x3"/>
   <p:notesSz cx="6858000" cy="9144000"/>
@@ -112,6 +120,22 @@
       </a:defRPr>
     </a:lvl9pPr>
   </p:defaultTextStyle>
+  <p:extLst>
+    <p:ext uri="{EFAFB233-063F-42B5-8137-9DF3F51BA10A}">
+      <p15:sldGuideLst xmlns:p15="http://schemas.microsoft.com/office/powerpoint/2012/main">
+        <p15:guide id="1" orient="horz" pos="2160">
+          <p15:clr>
+            <a:srgbClr val="A4A3A4"/>
+          </p15:clr>
+        </p15:guide>
+        <p15:guide id="2" pos="2880">
+          <p15:clr>
+            <a:srgbClr val="A4A3A4"/>
+          </p15:clr>
+        </p15:guide>
+      </p15:sldGuideLst>
+    </p:ext>
+  </p:extLst>
 </p:presentation>
 </file>
 
@@ -1076,10 +1100,24 @@
     <dgm:pt modelId="{EE4BD3A9-8495-B44A-B5C7-84752F03004B}" type="pres">
       <dgm:prSet presAssocID="{937A1529-DFBF-3A4D-9417-3F5F10A0E25F}" presName="sibTrans" presStyleLbl="sibTrans2D1" presStyleIdx="0" presStyleCnt="3"/>
       <dgm:spPr/>
+      <dgm:t>
+        <a:bodyPr/>
+        <a:lstStyle/>
+        <a:p>
+          <a:endParaRPr lang="en-US"/>
+        </a:p>
+      </dgm:t>
     </dgm:pt>
     <dgm:pt modelId="{1DE1899C-5112-1642-9735-3649BA51EAF1}" type="pres">
       <dgm:prSet presAssocID="{937A1529-DFBF-3A4D-9417-3F5F10A0E25F}" presName="connectorText" presStyleLbl="sibTrans2D1" presStyleIdx="0" presStyleCnt="3"/>
       <dgm:spPr/>
+      <dgm:t>
+        <a:bodyPr/>
+        <a:lstStyle/>
+        <a:p>
+          <a:endParaRPr lang="en-US"/>
+        </a:p>
+      </dgm:t>
     </dgm:pt>
     <dgm:pt modelId="{5B9D0AB4-5898-CA45-B427-1AF4F9E752AD}" type="pres">
       <dgm:prSet presAssocID="{99D8FB18-A84E-1846-876B-D80B87A37508}" presName="node" presStyleLbl="node1" presStyleIdx="1" presStyleCnt="4">
@@ -1099,10 +1137,24 @@
     <dgm:pt modelId="{5542F085-542C-AD4B-B5A9-2111D8FEFB43}" type="pres">
       <dgm:prSet presAssocID="{EA795878-907C-7843-876A-3551CDFF5E4C}" presName="sibTrans" presStyleLbl="sibTrans2D1" presStyleIdx="1" presStyleCnt="3"/>
       <dgm:spPr/>
+      <dgm:t>
+        <a:bodyPr/>
+        <a:lstStyle/>
+        <a:p>
+          <a:endParaRPr lang="en-US"/>
+        </a:p>
+      </dgm:t>
     </dgm:pt>
     <dgm:pt modelId="{65CE8AE3-188D-3E4D-9246-D8E18E1BFF0E}" type="pres">
       <dgm:prSet presAssocID="{EA795878-907C-7843-876A-3551CDFF5E4C}" presName="connectorText" presStyleLbl="sibTrans2D1" presStyleIdx="1" presStyleCnt="3"/>
       <dgm:spPr/>
+      <dgm:t>
+        <a:bodyPr/>
+        <a:lstStyle/>
+        <a:p>
+          <a:endParaRPr lang="en-US"/>
+        </a:p>
+      </dgm:t>
     </dgm:pt>
     <dgm:pt modelId="{05F04094-20CC-C44E-95A3-1619F2DF8955}" type="pres">
       <dgm:prSet presAssocID="{11FA9431-A6F3-5748-96D9-AF2F8C7F2A5A}" presName="node" presStyleLbl="node1" presStyleIdx="2" presStyleCnt="4">
@@ -1111,14 +1163,35 @@
         </dgm:presLayoutVars>
       </dgm:prSet>
       <dgm:spPr/>
+      <dgm:t>
+        <a:bodyPr/>
+        <a:lstStyle/>
+        <a:p>
+          <a:endParaRPr lang="en-US"/>
+        </a:p>
+      </dgm:t>
     </dgm:pt>
     <dgm:pt modelId="{C99880E0-9638-544C-B1A0-DB8C6D16717C}" type="pres">
       <dgm:prSet presAssocID="{1D4466C8-5363-3440-9D43-DE76C8C75297}" presName="sibTrans" presStyleLbl="sibTrans2D1" presStyleIdx="2" presStyleCnt="3"/>
       <dgm:spPr/>
+      <dgm:t>
+        <a:bodyPr/>
+        <a:lstStyle/>
+        <a:p>
+          <a:endParaRPr lang="en-US"/>
+        </a:p>
+      </dgm:t>
     </dgm:pt>
     <dgm:pt modelId="{914D1A3C-DA39-104F-A7CD-2062AC0CE513}" type="pres">
       <dgm:prSet presAssocID="{1D4466C8-5363-3440-9D43-DE76C8C75297}" presName="connectorText" presStyleLbl="sibTrans2D1" presStyleIdx="2" presStyleCnt="3"/>
       <dgm:spPr/>
+      <dgm:t>
+        <a:bodyPr/>
+        <a:lstStyle/>
+        <a:p>
+          <a:endParaRPr lang="en-US"/>
+        </a:p>
+      </dgm:t>
     </dgm:pt>
     <dgm:pt modelId="{32EA81DC-3BA8-234C-A7D4-85FA11570585}" type="pres">
       <dgm:prSet presAssocID="{0B50702B-2904-4040-BFDF-3016D353FA2D}" presName="node" presStyleLbl="node1" presStyleIdx="3" presStyleCnt="4">
@@ -1147,8 +1220,8 @@
     <dgm:cxn modelId="{C80878EA-67E7-D244-85B0-E7AF901EB804}" type="presOf" srcId="{11FA9431-A6F3-5748-96D9-AF2F8C7F2A5A}" destId="{05F04094-20CC-C44E-95A3-1619F2DF8955}" srcOrd="0" destOrd="0" presId="urn:microsoft.com/office/officeart/2005/8/layout/process1"/>
     <dgm:cxn modelId="{2CEF1365-AE53-2D4D-AA0B-1FA92DB29E26}" type="presOf" srcId="{1D4466C8-5363-3440-9D43-DE76C8C75297}" destId="{914D1A3C-DA39-104F-A7CD-2062AC0CE513}" srcOrd="1" destOrd="0" presId="urn:microsoft.com/office/officeart/2005/8/layout/process1"/>
     <dgm:cxn modelId="{503ADB5E-2229-7341-9D99-4800B16F9DD8}" srcId="{C26BA7F7-B3FF-134B-AF32-7F048D81819A}" destId="{11FA9431-A6F3-5748-96D9-AF2F8C7F2A5A}" srcOrd="2" destOrd="0" parTransId="{06FC8019-354E-964D-AA1A-52CDA71F80B7}" sibTransId="{1D4466C8-5363-3440-9D43-DE76C8C75297}"/>
+    <dgm:cxn modelId="{48555D16-35B8-3340-89CC-50CC586A5A03}" type="presOf" srcId="{937A1529-DFBF-3A4D-9417-3F5F10A0E25F}" destId="{1DE1899C-5112-1642-9735-3649BA51EAF1}" srcOrd="1" destOrd="0" presId="urn:microsoft.com/office/officeart/2005/8/layout/process1"/>
     <dgm:cxn modelId="{40657241-D1EB-1441-A048-32389B7C2E68}" type="presOf" srcId="{99D8FB18-A84E-1846-876B-D80B87A37508}" destId="{5B9D0AB4-5898-CA45-B427-1AF4F9E752AD}" srcOrd="0" destOrd="0" presId="urn:microsoft.com/office/officeart/2005/8/layout/process1"/>
-    <dgm:cxn modelId="{48555D16-35B8-3340-89CC-50CC586A5A03}" type="presOf" srcId="{937A1529-DFBF-3A4D-9417-3F5F10A0E25F}" destId="{1DE1899C-5112-1642-9735-3649BA51EAF1}" srcOrd="1" destOrd="0" presId="urn:microsoft.com/office/officeart/2005/8/layout/process1"/>
     <dgm:cxn modelId="{AFE27A80-FFC9-F444-BA62-390E008BB42E}" srcId="{C26BA7F7-B3FF-134B-AF32-7F048D81819A}" destId="{D368452F-1CE8-014A-A1FC-D94AE9F4B7F9}" srcOrd="0" destOrd="0" parTransId="{E92FBD40-F246-9843-B937-46A1CA33E9B5}" sibTransId="{937A1529-DFBF-3A4D-9417-3F5F10A0E25F}"/>
     <dgm:cxn modelId="{193B0E47-F8D3-3342-B75D-A513782F8A47}" type="presOf" srcId="{937A1529-DFBF-3A4D-9417-3F5F10A0E25F}" destId="{EE4BD3A9-8495-B44A-B5C7-84752F03004B}" srcOrd="0" destOrd="0" presId="urn:microsoft.com/office/officeart/2005/8/layout/process1"/>
     <dgm:cxn modelId="{97F181F0-DEA3-F543-9D70-0B0D4276E24C}" srcId="{C26BA7F7-B3FF-134B-AF32-7F048D81819A}" destId="{0B50702B-2904-4040-BFDF-3016D353FA2D}" srcOrd="3" destOrd="0" parTransId="{D945BBAB-7EF7-1B4F-B7F7-F9265EB0A287}" sibTransId="{C1034C70-18F3-E442-860C-4B08688DC757}"/>
@@ -3067,6 +3140,608 @@
 </dgm:styleDef>
 </file>
 
+<file path=ppt/notesMasters/notesMaster1.xml><?xml version="1.0" encoding="utf-8"?>
+<p:notesMaster xmlns:a="http://schemas.openxmlformats.org/drawingml/2006/main" xmlns:r="http://schemas.openxmlformats.org/officeDocument/2006/relationships" xmlns:p="http://schemas.openxmlformats.org/presentationml/2006/main">
+  <p:cSld>
+    <p:bg>
+      <p:bgRef idx="1001">
+        <a:schemeClr val="bg1"/>
+      </p:bgRef>
+    </p:bg>
+    <p:spTree>
+      <p:nvGrpSpPr>
+        <p:cNvPr id="1" name=""/>
+        <p:cNvGrpSpPr/>
+        <p:nvPr/>
+      </p:nvGrpSpPr>
+      <p:grpSpPr>
+        <a:xfrm>
+          <a:off x="0" y="0"/>
+          <a:ext cx="0" cy="0"/>
+          <a:chOff x="0" y="0"/>
+          <a:chExt cx="0" cy="0"/>
+        </a:xfrm>
+      </p:grpSpPr>
+      <p:sp>
+        <p:nvSpPr>
+          <p:cNvPr id="2" name="Header Placeholder 1"/>
+          <p:cNvSpPr>
+            <a:spLocks noGrp="1"/>
+          </p:cNvSpPr>
+          <p:nvPr>
+            <p:ph type="hdr" sz="quarter"/>
+          </p:nvPr>
+        </p:nvSpPr>
+        <p:spPr>
+          <a:xfrm>
+            <a:off x="0" y="0"/>
+            <a:ext cx="2971800" cy="458788"/>
+          </a:xfrm>
+          <a:prstGeom prst="rect">
+            <a:avLst/>
+          </a:prstGeom>
+        </p:spPr>
+        <p:txBody>
+          <a:bodyPr vert="horz" lIns="91440" tIns="45720" rIns="91440" bIns="45720" rtlCol="0"/>
+          <a:lstStyle>
+            <a:lvl1pPr algn="l">
+              <a:defRPr sz="1200"/>
+            </a:lvl1pPr>
+          </a:lstStyle>
+          <a:p>
+            <a:endParaRPr lang="en-US"/>
+          </a:p>
+        </p:txBody>
+      </p:sp>
+      <p:sp>
+        <p:nvSpPr>
+          <p:cNvPr id="3" name="Date Placeholder 2"/>
+          <p:cNvSpPr>
+            <a:spLocks noGrp="1"/>
+          </p:cNvSpPr>
+          <p:nvPr>
+            <p:ph type="dt" idx="1"/>
+          </p:nvPr>
+        </p:nvSpPr>
+        <p:spPr>
+          <a:xfrm>
+            <a:off x="3884613" y="0"/>
+            <a:ext cx="2971800" cy="458788"/>
+          </a:xfrm>
+          <a:prstGeom prst="rect">
+            <a:avLst/>
+          </a:prstGeom>
+        </p:spPr>
+        <p:txBody>
+          <a:bodyPr vert="horz" lIns="91440" tIns="45720" rIns="91440" bIns="45720" rtlCol="0"/>
+          <a:lstStyle>
+            <a:lvl1pPr algn="r">
+              <a:defRPr sz="1200"/>
+            </a:lvl1pPr>
+          </a:lstStyle>
+          <a:p>
+            <a:fld id="{583E5472-D465-4570-8639-788820AE74DF}" type="datetimeFigureOut">
+              <a:rPr lang="en-US" smtClean="0"/>
+              <a:t>4/25/2016</a:t>
+            </a:fld>
+            <a:endParaRPr lang="en-US"/>
+          </a:p>
+        </p:txBody>
+      </p:sp>
+      <p:sp>
+        <p:nvSpPr>
+          <p:cNvPr id="4" name="Slide Image Placeholder 3"/>
+          <p:cNvSpPr>
+            <a:spLocks noGrp="1" noRot="1" noChangeAspect="1"/>
+          </p:cNvSpPr>
+          <p:nvPr>
+            <p:ph type="sldImg" idx="2"/>
+          </p:nvPr>
+        </p:nvSpPr>
+        <p:spPr>
+          <a:xfrm>
+            <a:off x="1371600" y="1143000"/>
+            <a:ext cx="4114800" cy="3086100"/>
+          </a:xfrm>
+          <a:prstGeom prst="rect">
+            <a:avLst/>
+          </a:prstGeom>
+          <a:noFill/>
+          <a:ln w="12700">
+            <a:solidFill>
+              <a:prstClr val="black"/>
+            </a:solidFill>
+          </a:ln>
+        </p:spPr>
+        <p:txBody>
+          <a:bodyPr vert="horz" lIns="91440" tIns="45720" rIns="91440" bIns="45720" rtlCol="0" anchor="ctr"/>
+          <a:lstStyle/>
+          <a:p>
+            <a:endParaRPr lang="en-US"/>
+          </a:p>
+        </p:txBody>
+      </p:sp>
+      <p:sp>
+        <p:nvSpPr>
+          <p:cNvPr id="5" name="Notes Placeholder 4"/>
+          <p:cNvSpPr>
+            <a:spLocks noGrp="1"/>
+          </p:cNvSpPr>
+          <p:nvPr>
+            <p:ph type="body" sz="quarter" idx="3"/>
+          </p:nvPr>
+        </p:nvSpPr>
+        <p:spPr>
+          <a:xfrm>
+            <a:off x="685800" y="4400550"/>
+            <a:ext cx="5486400" cy="3600450"/>
+          </a:xfrm>
+          <a:prstGeom prst="rect">
+            <a:avLst/>
+          </a:prstGeom>
+        </p:spPr>
+        <p:txBody>
+          <a:bodyPr vert="horz" lIns="91440" tIns="45720" rIns="91440" bIns="45720" rtlCol="0"/>
+          <a:lstStyle/>
+          <a:p>
+            <a:pPr lvl="0"/>
+            <a:r>
+              <a:rPr lang="en-US" smtClean="0"/>
+              <a:t>Edit Master text styles</a:t>
+            </a:r>
+          </a:p>
+          <a:p>
+            <a:pPr lvl="1"/>
+            <a:r>
+              <a:rPr lang="en-US" smtClean="0"/>
+              <a:t>Second level</a:t>
+            </a:r>
+          </a:p>
+          <a:p>
+            <a:pPr lvl="2"/>
+            <a:r>
+              <a:rPr lang="en-US" smtClean="0"/>
+              <a:t>Third level</a:t>
+            </a:r>
+          </a:p>
+          <a:p>
+            <a:pPr lvl="3"/>
+            <a:r>
+              <a:rPr lang="en-US" smtClean="0"/>
+              <a:t>Fourth level</a:t>
+            </a:r>
+          </a:p>
+          <a:p>
+            <a:pPr lvl="4"/>
+            <a:r>
+              <a:rPr lang="en-US" smtClean="0"/>
+              <a:t>Fifth level</a:t>
+            </a:r>
+            <a:endParaRPr lang="en-US"/>
+          </a:p>
+        </p:txBody>
+      </p:sp>
+      <p:sp>
+        <p:nvSpPr>
+          <p:cNvPr id="6" name="Footer Placeholder 5"/>
+          <p:cNvSpPr>
+            <a:spLocks noGrp="1"/>
+          </p:cNvSpPr>
+          <p:nvPr>
+            <p:ph type="ftr" sz="quarter" idx="4"/>
+          </p:nvPr>
+        </p:nvSpPr>
+        <p:spPr>
+          <a:xfrm>
+            <a:off x="0" y="8685213"/>
+            <a:ext cx="2971800" cy="458787"/>
+          </a:xfrm>
+          <a:prstGeom prst="rect">
+            <a:avLst/>
+          </a:prstGeom>
+        </p:spPr>
+        <p:txBody>
+          <a:bodyPr vert="horz" lIns="91440" tIns="45720" rIns="91440" bIns="45720" rtlCol="0" anchor="b"/>
+          <a:lstStyle>
+            <a:lvl1pPr algn="l">
+              <a:defRPr sz="1200"/>
+            </a:lvl1pPr>
+          </a:lstStyle>
+          <a:p>
+            <a:endParaRPr lang="en-US"/>
+          </a:p>
+        </p:txBody>
+      </p:sp>
+      <p:sp>
+        <p:nvSpPr>
+          <p:cNvPr id="7" name="Slide Number Placeholder 6"/>
+          <p:cNvSpPr>
+            <a:spLocks noGrp="1"/>
+          </p:cNvSpPr>
+          <p:nvPr>
+            <p:ph type="sldNum" sz="quarter" idx="5"/>
+          </p:nvPr>
+        </p:nvSpPr>
+        <p:spPr>
+          <a:xfrm>
+            <a:off x="3884613" y="8685213"/>
+            <a:ext cx="2971800" cy="458787"/>
+          </a:xfrm>
+          <a:prstGeom prst="rect">
+            <a:avLst/>
+          </a:prstGeom>
+        </p:spPr>
+        <p:txBody>
+          <a:bodyPr vert="horz" lIns="91440" tIns="45720" rIns="91440" bIns="45720" rtlCol="0" anchor="b"/>
+          <a:lstStyle>
+            <a:lvl1pPr algn="r">
+              <a:defRPr sz="1200"/>
+            </a:lvl1pPr>
+          </a:lstStyle>
+          <a:p>
+            <a:fld id="{9E4E191B-67F0-4229-9476-D8D24AA75E97}" type="slidenum">
+              <a:rPr lang="en-US" smtClean="0"/>
+              <a:t>‹#›</a:t>
+            </a:fld>
+            <a:endParaRPr lang="en-US"/>
+          </a:p>
+        </p:txBody>
+      </p:sp>
+    </p:spTree>
+    <p:extLst>
+      <p:ext uri="{BB962C8B-B14F-4D97-AF65-F5344CB8AC3E}">
+        <p14:creationId xmlns:p14="http://schemas.microsoft.com/office/powerpoint/2010/main" val="1903478381"/>
+      </p:ext>
+    </p:extLst>
+  </p:cSld>
+  <p:clrMap bg1="lt1" tx1="dk1" bg2="lt2" tx2="dk2" accent1="accent1" accent2="accent2" accent3="accent3" accent4="accent4" accent5="accent5" accent6="accent6" hlink="hlink" folHlink="folHlink"/>
+  <p:notesStyle>
+    <a:lvl1pPr marL="0" algn="l" defTabSz="914400" rtl="0" eaLnBrk="1" latinLnBrk="0" hangingPunct="1">
+      <a:defRPr sz="1200" kern="1200">
+        <a:solidFill>
+          <a:schemeClr val="tx1"/>
+        </a:solidFill>
+        <a:latin typeface="+mn-lt"/>
+        <a:ea typeface="+mn-ea"/>
+        <a:cs typeface="+mn-cs"/>
+      </a:defRPr>
+    </a:lvl1pPr>
+    <a:lvl2pPr marL="457200" algn="l" defTabSz="914400" rtl="0" eaLnBrk="1" latinLnBrk="0" hangingPunct="1">
+      <a:defRPr sz="1200" kern="1200">
+        <a:solidFill>
+          <a:schemeClr val="tx1"/>
+        </a:solidFill>
+        <a:latin typeface="+mn-lt"/>
+        <a:ea typeface="+mn-ea"/>
+        <a:cs typeface="+mn-cs"/>
+      </a:defRPr>
+    </a:lvl2pPr>
+    <a:lvl3pPr marL="914400" algn="l" defTabSz="914400" rtl="0" eaLnBrk="1" latinLnBrk="0" hangingPunct="1">
+      <a:defRPr sz="1200" kern="1200">
+        <a:solidFill>
+          <a:schemeClr val="tx1"/>
+        </a:solidFill>
+        <a:latin typeface="+mn-lt"/>
+        <a:ea typeface="+mn-ea"/>
+        <a:cs typeface="+mn-cs"/>
+      </a:defRPr>
+    </a:lvl3pPr>
+    <a:lvl4pPr marL="1371600" algn="l" defTabSz="914400" rtl="0" eaLnBrk="1" latinLnBrk="0" hangingPunct="1">
+      <a:defRPr sz="1200" kern="1200">
+        <a:solidFill>
+          <a:schemeClr val="tx1"/>
+        </a:solidFill>
+        <a:latin typeface="+mn-lt"/>
+        <a:ea typeface="+mn-ea"/>
+        <a:cs typeface="+mn-cs"/>
+      </a:defRPr>
+    </a:lvl4pPr>
+    <a:lvl5pPr marL="1828800" algn="l" defTabSz="914400" rtl="0" eaLnBrk="1" latinLnBrk="0" hangingPunct="1">
+      <a:defRPr sz="1200" kern="1200">
+        <a:solidFill>
+          <a:schemeClr val="tx1"/>
+        </a:solidFill>
+        <a:latin typeface="+mn-lt"/>
+        <a:ea typeface="+mn-ea"/>
+        <a:cs typeface="+mn-cs"/>
+      </a:defRPr>
+    </a:lvl5pPr>
+    <a:lvl6pPr marL="2286000" algn="l" defTabSz="914400" rtl="0" eaLnBrk="1" latinLnBrk="0" hangingPunct="1">
+      <a:defRPr sz="1200" kern="1200">
+        <a:solidFill>
+          <a:schemeClr val="tx1"/>
+        </a:solidFill>
+        <a:latin typeface="+mn-lt"/>
+        <a:ea typeface="+mn-ea"/>
+        <a:cs typeface="+mn-cs"/>
+      </a:defRPr>
+    </a:lvl6pPr>
+    <a:lvl7pPr marL="2743200" algn="l" defTabSz="914400" rtl="0" eaLnBrk="1" latinLnBrk="0" hangingPunct="1">
+      <a:defRPr sz="1200" kern="1200">
+        <a:solidFill>
+          <a:schemeClr val="tx1"/>
+        </a:solidFill>
+        <a:latin typeface="+mn-lt"/>
+        <a:ea typeface="+mn-ea"/>
+        <a:cs typeface="+mn-cs"/>
+      </a:defRPr>
+    </a:lvl7pPr>
+    <a:lvl8pPr marL="3200400" algn="l" defTabSz="914400" rtl="0" eaLnBrk="1" latinLnBrk="0" hangingPunct="1">
+      <a:defRPr sz="1200" kern="1200">
+        <a:solidFill>
+          <a:schemeClr val="tx1"/>
+        </a:solidFill>
+        <a:latin typeface="+mn-lt"/>
+        <a:ea typeface="+mn-ea"/>
+        <a:cs typeface="+mn-cs"/>
+      </a:defRPr>
+    </a:lvl8pPr>
+    <a:lvl9pPr marL="3657600" algn="l" defTabSz="914400" rtl="0" eaLnBrk="1" latinLnBrk="0" hangingPunct="1">
+      <a:defRPr sz="1200" kern="1200">
+        <a:solidFill>
+          <a:schemeClr val="tx1"/>
+        </a:solidFill>
+        <a:latin typeface="+mn-lt"/>
+        <a:ea typeface="+mn-ea"/>
+        <a:cs typeface="+mn-cs"/>
+      </a:defRPr>
+    </a:lvl9pPr>
+  </p:notesStyle>
+</p:notesMaster>
+</file>
+
+<file path=ppt/notesSlides/notesSlide1.xml><?xml version="1.0" encoding="utf-8"?>
+<p:notes xmlns:a="http://schemas.openxmlformats.org/drawingml/2006/main" xmlns:r="http://schemas.openxmlformats.org/officeDocument/2006/relationships" xmlns:p="http://schemas.openxmlformats.org/presentationml/2006/main">
+  <p:cSld>
+    <p:spTree>
+      <p:nvGrpSpPr>
+        <p:cNvPr id="1" name=""/>
+        <p:cNvGrpSpPr/>
+        <p:nvPr/>
+      </p:nvGrpSpPr>
+      <p:grpSpPr>
+        <a:xfrm>
+          <a:off x="0" y="0"/>
+          <a:ext cx="0" cy="0"/>
+          <a:chOff x="0" y="0"/>
+          <a:chExt cx="0" cy="0"/>
+        </a:xfrm>
+      </p:grpSpPr>
+      <p:sp>
+        <p:nvSpPr>
+          <p:cNvPr id="2" name="Slide Image Placeholder 1"/>
+          <p:cNvSpPr>
+            <a:spLocks noGrp="1" noRot="1" noChangeAspect="1"/>
+          </p:cNvSpPr>
+          <p:nvPr>
+            <p:ph type="sldImg"/>
+          </p:nvPr>
+        </p:nvSpPr>
+        <p:spPr/>
+      </p:sp>
+      <p:sp>
+        <p:nvSpPr>
+          <p:cNvPr id="3" name="Notes Placeholder 2"/>
+          <p:cNvSpPr>
+            <a:spLocks noGrp="1"/>
+          </p:cNvSpPr>
+          <p:nvPr>
+            <p:ph type="body" idx="1"/>
+          </p:nvPr>
+        </p:nvSpPr>
+        <p:spPr/>
+        <p:txBody>
+          <a:bodyPr/>
+          <a:lstStyle/>
+          <a:p>
+            <a:endParaRPr lang="en-US" dirty="0"/>
+          </a:p>
+        </p:txBody>
+      </p:sp>
+      <p:sp>
+        <p:nvSpPr>
+          <p:cNvPr id="4" name="Slide Number Placeholder 3"/>
+          <p:cNvSpPr>
+            <a:spLocks noGrp="1"/>
+          </p:cNvSpPr>
+          <p:nvPr>
+            <p:ph type="sldNum" sz="quarter" idx="10"/>
+          </p:nvPr>
+        </p:nvSpPr>
+        <p:spPr/>
+        <p:txBody>
+          <a:bodyPr/>
+          <a:lstStyle/>
+          <a:p>
+            <a:fld id="{9E4E191B-67F0-4229-9476-D8D24AA75E97}" type="slidenum">
+              <a:rPr lang="en-US" smtClean="0"/>
+              <a:t>6</a:t>
+            </a:fld>
+            <a:endParaRPr lang="en-US"/>
+          </a:p>
+        </p:txBody>
+      </p:sp>
+    </p:spTree>
+    <p:extLst>
+      <p:ext uri="{BB962C8B-B14F-4D97-AF65-F5344CB8AC3E}">
+        <p14:creationId xmlns:p14="http://schemas.microsoft.com/office/powerpoint/2010/main" val="349332119"/>
+      </p:ext>
+    </p:extLst>
+  </p:cSld>
+  <p:clrMapOvr>
+    <a:masterClrMapping/>
+  </p:clrMapOvr>
+</p:notes>
+</file>
+
+<file path=ppt/notesSlides/notesSlide2.xml><?xml version="1.0" encoding="utf-8"?>
+<p:notes xmlns:a="http://schemas.openxmlformats.org/drawingml/2006/main" xmlns:r="http://schemas.openxmlformats.org/officeDocument/2006/relationships" xmlns:p="http://schemas.openxmlformats.org/presentationml/2006/main">
+  <p:cSld>
+    <p:spTree>
+      <p:nvGrpSpPr>
+        <p:cNvPr id="1" name=""/>
+        <p:cNvGrpSpPr/>
+        <p:nvPr/>
+      </p:nvGrpSpPr>
+      <p:grpSpPr>
+        <a:xfrm>
+          <a:off x="0" y="0"/>
+          <a:ext cx="0" cy="0"/>
+          <a:chOff x="0" y="0"/>
+          <a:chExt cx="0" cy="0"/>
+        </a:xfrm>
+      </p:grpSpPr>
+      <p:sp>
+        <p:nvSpPr>
+          <p:cNvPr id="2" name="Slide Image Placeholder 1"/>
+          <p:cNvSpPr>
+            <a:spLocks noGrp="1" noRot="1" noChangeAspect="1"/>
+          </p:cNvSpPr>
+          <p:nvPr>
+            <p:ph type="sldImg"/>
+          </p:nvPr>
+        </p:nvSpPr>
+        <p:spPr/>
+      </p:sp>
+      <p:sp>
+        <p:nvSpPr>
+          <p:cNvPr id="3" name="Notes Placeholder 2"/>
+          <p:cNvSpPr>
+            <a:spLocks noGrp="1"/>
+          </p:cNvSpPr>
+          <p:nvPr>
+            <p:ph type="body" idx="1"/>
+          </p:nvPr>
+        </p:nvSpPr>
+        <p:spPr/>
+        <p:txBody>
+          <a:bodyPr/>
+          <a:lstStyle/>
+          <a:p>
+            <a:endParaRPr lang="en-US" dirty="0"/>
+          </a:p>
+        </p:txBody>
+      </p:sp>
+      <p:sp>
+        <p:nvSpPr>
+          <p:cNvPr id="4" name="Slide Number Placeholder 3"/>
+          <p:cNvSpPr>
+            <a:spLocks noGrp="1"/>
+          </p:cNvSpPr>
+          <p:nvPr>
+            <p:ph type="sldNum" sz="quarter" idx="10"/>
+          </p:nvPr>
+        </p:nvSpPr>
+        <p:spPr/>
+        <p:txBody>
+          <a:bodyPr/>
+          <a:lstStyle/>
+          <a:p>
+            <a:fld id="{9E4E191B-67F0-4229-9476-D8D24AA75E97}" type="slidenum">
+              <a:rPr lang="en-US" smtClean="0"/>
+              <a:t>9</a:t>
+            </a:fld>
+            <a:endParaRPr lang="en-US"/>
+          </a:p>
+        </p:txBody>
+      </p:sp>
+    </p:spTree>
+    <p:extLst>
+      <p:ext uri="{BB962C8B-B14F-4D97-AF65-F5344CB8AC3E}">
+        <p14:creationId xmlns:p14="http://schemas.microsoft.com/office/powerpoint/2010/main" val="2538998464"/>
+      </p:ext>
+    </p:extLst>
+  </p:cSld>
+  <p:clrMapOvr>
+    <a:masterClrMapping/>
+  </p:clrMapOvr>
+</p:notes>
+</file>
+
+<file path=ppt/notesSlides/notesSlide3.xml><?xml version="1.0" encoding="utf-8"?>
+<p:notes xmlns:a="http://schemas.openxmlformats.org/drawingml/2006/main" xmlns:r="http://schemas.openxmlformats.org/officeDocument/2006/relationships" xmlns:p="http://schemas.openxmlformats.org/presentationml/2006/main">
+  <p:cSld>
+    <p:spTree>
+      <p:nvGrpSpPr>
+        <p:cNvPr id="1" name=""/>
+        <p:cNvGrpSpPr/>
+        <p:nvPr/>
+      </p:nvGrpSpPr>
+      <p:grpSpPr>
+        <a:xfrm>
+          <a:off x="0" y="0"/>
+          <a:ext cx="0" cy="0"/>
+          <a:chOff x="0" y="0"/>
+          <a:chExt cx="0" cy="0"/>
+        </a:xfrm>
+      </p:grpSpPr>
+      <p:sp>
+        <p:nvSpPr>
+          <p:cNvPr id="2" name="Slide Image Placeholder 1"/>
+          <p:cNvSpPr>
+            <a:spLocks noGrp="1" noRot="1" noChangeAspect="1"/>
+          </p:cNvSpPr>
+          <p:nvPr>
+            <p:ph type="sldImg"/>
+          </p:nvPr>
+        </p:nvSpPr>
+        <p:spPr/>
+      </p:sp>
+      <p:sp>
+        <p:nvSpPr>
+          <p:cNvPr id="3" name="Notes Placeholder 2"/>
+          <p:cNvSpPr>
+            <a:spLocks noGrp="1"/>
+          </p:cNvSpPr>
+          <p:nvPr>
+            <p:ph type="body" idx="1"/>
+          </p:nvPr>
+        </p:nvSpPr>
+        <p:spPr/>
+        <p:txBody>
+          <a:bodyPr/>
+          <a:lstStyle/>
+          <a:p>
+            <a:endParaRPr lang="en-US" dirty="0"/>
+          </a:p>
+        </p:txBody>
+      </p:sp>
+      <p:sp>
+        <p:nvSpPr>
+          <p:cNvPr id="4" name="Slide Number Placeholder 3"/>
+          <p:cNvSpPr>
+            <a:spLocks noGrp="1"/>
+          </p:cNvSpPr>
+          <p:nvPr>
+            <p:ph type="sldNum" sz="quarter" idx="10"/>
+          </p:nvPr>
+        </p:nvSpPr>
+        <p:spPr/>
+        <p:txBody>
+          <a:bodyPr/>
+          <a:lstStyle/>
+          <a:p>
+            <a:fld id="{9E4E191B-67F0-4229-9476-D8D24AA75E97}" type="slidenum">
+              <a:rPr lang="en-US" smtClean="0"/>
+              <a:t>11</a:t>
+            </a:fld>
+            <a:endParaRPr lang="en-US"/>
+          </a:p>
+        </p:txBody>
+      </p:sp>
+    </p:spTree>
+    <p:extLst>
+      <p:ext uri="{BB962C8B-B14F-4D97-AF65-F5344CB8AC3E}">
+        <p14:creationId xmlns:p14="http://schemas.microsoft.com/office/powerpoint/2010/main" val="2279692375"/>
+      </p:ext>
+    </p:extLst>
+  </p:cSld>
+  <p:clrMapOvr>
+    <a:masterClrMapping/>
+  </p:clrMapOvr>
+</p:notes>
+</file>
+
 <file path=ppt/slideLayouts/slideLayout1.xml><?xml version="1.0" encoding="utf-8"?>
 <p:sldLayout xmlns:a="http://schemas.openxmlformats.org/drawingml/2006/main" xmlns:r="http://schemas.openxmlformats.org/officeDocument/2006/relationships" xmlns:p="http://schemas.openxmlformats.org/presentationml/2006/main" showMasterSp="0" type="title" preserve="1">
   <p:cSld name="Title Slide">
@@ -3127,9 +3802,7 @@
         </p:style>
         <p:txBody>
           <a:bodyPr rtlCol="0" anchor="ctr"/>
-          <a:lstStyle>
-            <a:extLst/>
-          </a:lstStyle>
+          <a:lstStyle/>
           <a:p>
             <a:pPr algn="ctr" eaLnBrk="1" latinLnBrk="0" hangingPunct="1"/>
             <a:endParaRPr kumimoji="0" lang="en-US"/>
@@ -3315,7 +3988,7 @@
           <a:p>
             <a:fld id="{E336CA31-621F-9A4A-8807-CC9CD87B01BD}" type="datetimeFigureOut">
               <a:rPr lang="en-US" smtClean="0"/>
-              <a:t>4/25/16</a:t>
+              <a:t>4/25/2016</a:t>
             </a:fld>
             <a:endParaRPr lang="en-US"/>
           </a:p>
@@ -3409,9 +4082,7 @@
         </p:style>
         <p:txBody>
           <a:bodyPr rtlCol="0" anchor="ctr"/>
-          <a:lstStyle>
-            <a:extLst/>
-          </a:lstStyle>
+          <a:lstStyle/>
           <a:p>
             <a:pPr algn="ctr" eaLnBrk="1" latinLnBrk="0" hangingPunct="1"/>
             <a:endParaRPr kumimoji="0" lang="en-US"/>
@@ -3456,9 +4127,7 @@
         <p:spPr/>
         <p:txBody>
           <a:bodyPr/>
-          <a:lstStyle>
-            <a:extLst/>
-          </a:lstStyle>
+          <a:lstStyle/>
           <a:p>
             <a:r>
               <a:rPr kumimoji="0" lang="en-US" smtClean="0"/>
@@ -3481,9 +4150,7 @@
         <p:spPr/>
         <p:txBody>
           <a:bodyPr vert="eaVert"/>
-          <a:lstStyle>
-            <a:extLst/>
-          </a:lstStyle>
+          <a:lstStyle/>
           <a:p>
             <a:pPr lvl="0" eaLnBrk="1" latinLnBrk="0" hangingPunct="1"/>
             <a:r>
@@ -3539,7 +4206,7 @@
           <a:p>
             <a:fld id="{E336CA31-621F-9A4A-8807-CC9CD87B01BD}" type="datetimeFigureOut">
               <a:rPr lang="en-US" smtClean="0"/>
-              <a:t>4/25/16</a:t>
+              <a:t>4/25/2016</a:t>
             </a:fld>
             <a:endParaRPr lang="en-US"/>
           </a:p>
@@ -3657,9 +4324,7 @@
         </p:style>
         <p:txBody>
           <a:bodyPr rtlCol="0" anchor="ctr"/>
-          <a:lstStyle>
-            <a:extLst/>
-          </a:lstStyle>
+          <a:lstStyle/>
           <a:p>
             <a:pPr algn="ctr" eaLnBrk="1" latinLnBrk="0" hangingPunct="1"/>
             <a:endParaRPr kumimoji="0" lang="en-US"/>
@@ -3704,9 +4369,7 @@
         </p:style>
         <p:txBody>
           <a:bodyPr rtlCol="0" anchor="ctr"/>
-          <a:lstStyle>
-            <a:extLst/>
-          </a:lstStyle>
+          <a:lstStyle/>
           <a:p>
             <a:pPr algn="ctr" eaLnBrk="1" latinLnBrk="0" hangingPunct="1"/>
             <a:endParaRPr kumimoji="0" lang="en-US"/>
@@ -3731,9 +4394,7 @@
         </p:spPr>
         <p:txBody>
           <a:bodyPr vert="eaVert"/>
-          <a:lstStyle>
-            <a:extLst/>
-          </a:lstStyle>
+          <a:lstStyle/>
           <a:p>
             <a:r>
               <a:rPr kumimoji="0" lang="en-US" smtClean="0"/>
@@ -3761,9 +4422,7 @@
         </p:spPr>
         <p:txBody>
           <a:bodyPr vert="eaVert"/>
-          <a:lstStyle>
-            <a:extLst/>
-          </a:lstStyle>
+          <a:lstStyle/>
           <a:p>
             <a:pPr lvl="0" eaLnBrk="1" latinLnBrk="0" hangingPunct="1"/>
             <a:r>
@@ -3819,7 +4478,7 @@
           <a:p>
             <a:fld id="{E336CA31-621F-9A4A-8807-CC9CD87B01BD}" type="datetimeFigureOut">
               <a:rPr lang="en-US" smtClean="0"/>
-              <a:t>4/25/16</a:t>
+              <a:t>4/25/2016</a:t>
             </a:fld>
             <a:endParaRPr lang="en-US"/>
           </a:p>
@@ -3915,9 +4574,7 @@
         </p:spPr>
         <p:txBody>
           <a:bodyPr/>
-          <a:lstStyle>
-            <a:extLst/>
-          </a:lstStyle>
+          <a:lstStyle/>
           <a:p>
             <a:r>
               <a:rPr kumimoji="0" lang="en-US" smtClean="0"/>
@@ -3940,9 +4597,7 @@
         <p:spPr/>
         <p:txBody>
           <a:bodyPr/>
-          <a:lstStyle>
-            <a:extLst/>
-          </a:lstStyle>
+          <a:lstStyle/>
           <a:p>
             <a:pPr lvl="0" eaLnBrk="1" latinLnBrk="0" hangingPunct="1"/>
             <a:r>
@@ -3998,7 +4653,7 @@
           <a:p>
             <a:fld id="{E336CA31-621F-9A4A-8807-CC9CD87B01BD}" type="datetimeFigureOut">
               <a:rPr lang="en-US" smtClean="0"/>
-              <a:t>4/25/16</a:t>
+              <a:t>4/25/2016</a:t>
             </a:fld>
             <a:endParaRPr lang="en-US"/>
           </a:p>
@@ -4114,9 +4769,7 @@
         </p:style>
         <p:txBody>
           <a:bodyPr rtlCol="0" anchor="ctr"/>
-          <a:lstStyle>
-            <a:extLst/>
-          </a:lstStyle>
+          <a:lstStyle/>
           <a:p>
             <a:pPr algn="ctr" eaLnBrk="1" latinLnBrk="0" hangingPunct="1"/>
             <a:endParaRPr kumimoji="0" lang="en-US"/>
@@ -4168,9 +4821,7 @@
         </p:style>
         <p:txBody>
           <a:bodyPr rtlCol="0" anchor="ctr"/>
-          <a:lstStyle>
-            <a:extLst/>
-          </a:lstStyle>
+          <a:lstStyle/>
           <a:p>
             <a:pPr algn="ctr" eaLnBrk="1" latinLnBrk="0" hangingPunct="1"/>
             <a:endParaRPr kumimoji="0" lang="en-US"/>
@@ -4356,7 +5007,7 @@
           <a:p>
             <a:fld id="{E336CA31-621F-9A4A-8807-CC9CD87B01BD}" type="datetimeFigureOut">
               <a:rPr lang="en-US" smtClean="0"/>
-              <a:t>4/25/16</a:t>
+              <a:t>4/25/2016</a:t>
             </a:fld>
             <a:endParaRPr lang="en-US"/>
           </a:p>
@@ -4442,9 +5093,7 @@
         <p:spPr/>
         <p:txBody>
           <a:bodyPr/>
-          <a:lstStyle>
-            <a:extLst/>
-          </a:lstStyle>
+          <a:lstStyle/>
           <a:p>
             <a:r>
               <a:rPr kumimoji="0" lang="en-US" smtClean="0"/>
@@ -4643,7 +5292,7 @@
           <a:p>
             <a:fld id="{E336CA31-621F-9A4A-8807-CC9CD87B01BD}" type="datetimeFigureOut">
               <a:rPr lang="en-US" smtClean="0"/>
-              <a:t>4/25/16</a:t>
+              <a:t>4/25/2016</a:t>
             </a:fld>
             <a:endParaRPr lang="en-US"/>
           </a:p>
@@ -5065,7 +5714,7 @@
           <a:p>
             <a:fld id="{E336CA31-621F-9A4A-8807-CC9CD87B01BD}" type="datetimeFigureOut">
               <a:rPr lang="en-US" smtClean="0"/>
-              <a:t>4/25/16</a:t>
+              <a:t>4/25/2016</a:t>
             </a:fld>
             <a:endParaRPr lang="en-US"/>
           </a:p>
@@ -5151,9 +5800,7 @@
         <p:spPr/>
         <p:txBody>
           <a:bodyPr/>
-          <a:lstStyle>
-            <a:extLst/>
-          </a:lstStyle>
+          <a:lstStyle/>
           <a:p>
             <a:r>
               <a:rPr kumimoji="0" lang="en-US" smtClean="0"/>
@@ -5180,7 +5827,7 @@
           <a:p>
             <a:fld id="{E336CA31-621F-9A4A-8807-CC9CD87B01BD}" type="datetimeFigureOut">
               <a:rPr lang="en-US" smtClean="0"/>
-              <a:t>4/25/16</a:t>
+              <a:t>4/25/2016</a:t>
             </a:fld>
             <a:endParaRPr lang="en-US"/>
           </a:p>
@@ -5270,7 +5917,7 @@
           <a:p>
             <a:fld id="{E336CA31-621F-9A4A-8807-CC9CD87B01BD}" type="datetimeFigureOut">
               <a:rPr lang="en-US" smtClean="0"/>
-              <a:t>4/25/16</a:t>
+              <a:t>4/25/2016</a:t>
             </a:fld>
             <a:endParaRPr lang="en-US"/>
           </a:p>
@@ -5548,7 +6195,7 @@
           <a:p>
             <a:fld id="{E336CA31-621F-9A4A-8807-CC9CD87B01BD}" type="datetimeFigureOut">
               <a:rPr lang="en-US" smtClean="0"/>
-              <a:t>4/25/16</a:t>
+              <a:t>4/25/2016</a:t>
             </a:fld>
             <a:endParaRPr lang="en-US"/>
           </a:p>
@@ -5635,9 +6282,7 @@
         </p:style>
         <p:txBody>
           <a:bodyPr rtlCol="0" anchor="ctr"/>
-          <a:lstStyle>
-            <a:extLst/>
-          </a:lstStyle>
+          <a:lstStyle/>
           <a:p>
             <a:pPr algn="ctr" eaLnBrk="1" latinLnBrk="0" hangingPunct="1"/>
             <a:endParaRPr kumimoji="0" lang="en-US"/>
@@ -5682,9 +6327,7 @@
         </p:style>
         <p:txBody>
           <a:bodyPr rtlCol="0" anchor="ctr"/>
-          <a:lstStyle>
-            <a:extLst/>
-          </a:lstStyle>
+          <a:lstStyle/>
           <a:p>
             <a:pPr algn="ctr" eaLnBrk="1" latinLnBrk="0" hangingPunct="1"/>
             <a:endParaRPr kumimoji="0" lang="en-US"/>
@@ -5915,7 +6558,7 @@
           <a:p>
             <a:fld id="{E336CA31-621F-9A4A-8807-CC9CD87B01BD}" type="datetimeFigureOut">
               <a:rPr lang="en-US" smtClean="0"/>
-              <a:t>4/25/16</a:t>
+              <a:t>4/25/2016</a:t>
             </a:fld>
             <a:endParaRPr lang="en-US"/>
           </a:p>
@@ -5959,9 +6602,7 @@
         </p:style>
         <p:txBody>
           <a:bodyPr rtlCol="0" anchor="ctr"/>
-          <a:lstStyle>
-            <a:extLst/>
-          </a:lstStyle>
+          <a:lstStyle/>
           <a:p>
             <a:pPr algn="ctr" eaLnBrk="1" latinLnBrk="0" hangingPunct="1"/>
             <a:endParaRPr kumimoji="0" lang="en-US"/>
@@ -6006,9 +6647,7 @@
         </p:style>
         <p:txBody>
           <a:bodyPr rtlCol="0" anchor="ctr"/>
-          <a:lstStyle>
-            <a:extLst/>
-          </a:lstStyle>
+          <a:lstStyle/>
           <a:p>
             <a:pPr algn="ctr" eaLnBrk="1" latinLnBrk="0" hangingPunct="1"/>
             <a:endParaRPr kumimoji="0" lang="en-US"/>
@@ -6152,9 +6791,7 @@
         </p:style>
         <p:txBody>
           <a:bodyPr rtlCol="0" anchor="ctr"/>
-          <a:lstStyle>
-            <a:extLst/>
-          </a:lstStyle>
+          <a:lstStyle/>
           <a:p>
             <a:pPr algn="ctr" eaLnBrk="1" latinLnBrk="0" hangingPunct="1"/>
             <a:endParaRPr kumimoji="0" lang="en-US"/>
@@ -6199,9 +6836,7 @@
         </p:style>
         <p:txBody>
           <a:bodyPr rtlCol="0" anchor="ctr"/>
-          <a:lstStyle>
-            <a:extLst/>
-          </a:lstStyle>
+          <a:lstStyle/>
           <a:p>
             <a:pPr algn="ctr" eaLnBrk="1" latinLnBrk="0" hangingPunct="1"/>
             <a:endParaRPr kumimoji="0" lang="en-US"/>
@@ -6240,9 +6875,7 @@
               <a:bevelT w="50800" h="10160"/>
             </a:sp3d>
           </a:bodyPr>
-          <a:lstStyle>
-            <a:extLst/>
-          </a:lstStyle>
+          <a:lstStyle/>
           <a:p>
             <a:r>
               <a:rPr kumimoji="0" lang="en-US" smtClean="0"/>
@@ -6275,9 +6908,7 @@
           <a:bodyPr vert="horz" lIns="54864" tIns="91440" rtlCol="0">
             <a:normAutofit/>
           </a:bodyPr>
-          <a:lstStyle>
-            <a:extLst/>
-          </a:lstStyle>
+          <a:lstStyle/>
           <a:p>
             <a:pPr lvl="0" eaLnBrk="1" latinLnBrk="0" hangingPunct="1"/>
             <a:r>
@@ -6352,7 +6983,7 @@
           <a:p>
             <a:fld id="{E336CA31-621F-9A4A-8807-CC9CD87B01BD}" type="datetimeFigureOut">
               <a:rPr lang="en-US" smtClean="0"/>
-              <a:t>4/25/16</a:t>
+              <a:t>4/25/2016</a:t>
             </a:fld>
             <a:endParaRPr lang="en-US"/>
           </a:p>
@@ -6833,6 +7464,521 @@
   <p:clrMapOvr>
     <a:masterClrMapping/>
   </p:clrMapOvr>
+  <p:timing>
+    <p:tnLst>
+      <p:par>
+        <p:cTn id="1" dur="indefinite" restart="never" nodeType="tmRoot"/>
+      </p:par>
+    </p:tnLst>
+  </p:timing>
+</p:sld>
+</file>
+
+<file path=ppt/slides/slide10.xml><?xml version="1.0" encoding="utf-8"?>
+<p:sld xmlns:a="http://schemas.openxmlformats.org/drawingml/2006/main" xmlns:r="http://schemas.openxmlformats.org/officeDocument/2006/relationships" xmlns:p="http://schemas.openxmlformats.org/presentationml/2006/main">
+  <p:cSld>
+    <p:spTree>
+      <p:nvGrpSpPr>
+        <p:cNvPr id="1" name=""/>
+        <p:cNvGrpSpPr/>
+        <p:nvPr/>
+      </p:nvGrpSpPr>
+      <p:grpSpPr>
+        <a:xfrm>
+          <a:off x="0" y="0"/>
+          <a:ext cx="0" cy="0"/>
+          <a:chOff x="0" y="0"/>
+          <a:chExt cx="0" cy="0"/>
+        </a:xfrm>
+      </p:grpSpPr>
+      <p:sp>
+        <p:nvSpPr>
+          <p:cNvPr id="2" name="Title 1"/>
+          <p:cNvSpPr>
+            <a:spLocks noGrp="1"/>
+          </p:cNvSpPr>
+          <p:nvPr>
+            <p:ph type="title"/>
+          </p:nvPr>
+        </p:nvSpPr>
+        <p:spPr/>
+        <p:txBody>
+          <a:bodyPr/>
+          <a:lstStyle/>
+          <a:p>
+            <a:r>
+              <a:rPr lang="en-US" dirty="0" smtClean="0"/>
+              <a:t>Experiments</a:t>
+            </a:r>
+            <a:endParaRPr lang="en-US" dirty="0"/>
+          </a:p>
+        </p:txBody>
+      </p:sp>
+      <p:sp>
+        <p:nvSpPr>
+          <p:cNvPr id="3" name="Content Placeholder 2"/>
+          <p:cNvSpPr>
+            <a:spLocks noGrp="1"/>
+          </p:cNvSpPr>
+          <p:nvPr>
+            <p:ph idx="1"/>
+          </p:nvPr>
+        </p:nvSpPr>
+        <p:spPr/>
+        <p:txBody>
+          <a:bodyPr>
+            <a:normAutofit fontScale="92500" lnSpcReduction="10000"/>
+          </a:bodyPr>
+          <a:lstStyle/>
+          <a:p>
+            <a:r>
+              <a:rPr lang="en-US" dirty="0" smtClean="0"/>
+              <a:t>Study area</a:t>
+            </a:r>
+          </a:p>
+          <a:p>
+            <a:pPr lvl="1"/>
+            <a:r>
+              <a:rPr lang="en-US" dirty="0" smtClean="0"/>
+              <a:t>Huangshan City, 3891 vertices</a:t>
+            </a:r>
+          </a:p>
+          <a:p>
+            <a:r>
+              <a:rPr lang="en-US" dirty="0" smtClean="0"/>
+              <a:t>Point data</a:t>
+            </a:r>
+          </a:p>
+          <a:p>
+            <a:pPr lvl="1"/>
+            <a:r>
+              <a:rPr lang="en-US" dirty="0" smtClean="0"/>
+              <a:t>Geo-tweets, 408719</a:t>
+            </a:r>
+          </a:p>
+          <a:p>
+            <a:r>
+              <a:rPr lang="en-US" dirty="0" smtClean="0"/>
+              <a:t>Methods:</a:t>
+            </a:r>
+          </a:p>
+          <a:p>
+            <a:pPr lvl="1"/>
+            <a:r>
+              <a:rPr lang="en-US" dirty="0" err="1" smtClean="0"/>
+              <a:t>Pysal</a:t>
+            </a:r>
+            <a:endParaRPr lang="en-US" dirty="0" smtClean="0"/>
+          </a:p>
+          <a:p>
+            <a:pPr lvl="1"/>
+            <a:r>
+              <a:rPr lang="en-US" dirty="0" smtClean="0"/>
+              <a:t>Shapely</a:t>
+            </a:r>
+          </a:p>
+          <a:p>
+            <a:pPr lvl="1"/>
+            <a:r>
+              <a:rPr lang="en-US" dirty="0" err="1" smtClean="0"/>
+              <a:t>Quadtree</a:t>
+            </a:r>
+            <a:r>
+              <a:rPr lang="en-US" dirty="0" smtClean="0"/>
+              <a:t> structure</a:t>
+            </a:r>
+          </a:p>
+          <a:p>
+            <a:r>
+              <a:rPr lang="en-US" dirty="0" smtClean="0"/>
+              <a:t>Fix polygon vertices, vary point size</a:t>
+            </a:r>
+          </a:p>
+          <a:p>
+            <a:r>
+              <a:rPr lang="en-US" dirty="0" smtClean="0"/>
+              <a:t>Fix point size, vary polygon vertices</a:t>
+            </a:r>
+          </a:p>
+          <a:p>
+            <a:pPr lvl="1"/>
+            <a:endParaRPr lang="en-US" dirty="0"/>
+          </a:p>
+        </p:txBody>
+      </p:sp>
+      <p:pic>
+        <p:nvPicPr>
+          <p:cNvPr id="6" name="Picture 5"/>
+          <p:cNvPicPr>
+            <a:picLocks noChangeAspect="1"/>
+          </p:cNvPicPr>
+          <p:nvPr/>
+        </p:nvPicPr>
+        <p:blipFill>
+          <a:blip r:embed="rId2"/>
+          <a:stretch>
+            <a:fillRect/>
+          </a:stretch>
+        </p:blipFill>
+        <p:spPr>
+          <a:xfrm>
+            <a:off x="4783952" y="2727707"/>
+            <a:ext cx="3658305" cy="2501944"/>
+          </a:xfrm>
+          <a:prstGeom prst="rect">
+            <a:avLst/>
+          </a:prstGeom>
+          <a:ln>
+            <a:noFill/>
+          </a:ln>
+          <a:effectLst>
+            <a:outerShdw blurRad="292100" dist="139700" dir="2700000" algn="tl" rotWithShape="0">
+              <a:srgbClr val="333333">
+                <a:alpha val="65000"/>
+              </a:srgbClr>
+            </a:outerShdw>
+          </a:effectLst>
+        </p:spPr>
+      </p:pic>
+    </p:spTree>
+    <p:extLst>
+      <p:ext uri="{BB962C8B-B14F-4D97-AF65-F5344CB8AC3E}">
+        <p14:creationId xmlns:p14="http://schemas.microsoft.com/office/powerpoint/2010/main" val="2509787722"/>
+      </p:ext>
+    </p:extLst>
+  </p:cSld>
+  <p:clrMapOvr>
+    <a:masterClrMapping/>
+  </p:clrMapOvr>
+  <p:timing>
+    <p:tnLst>
+      <p:par>
+        <p:cTn id="1" dur="indefinite" restart="never" nodeType="tmRoot"/>
+      </p:par>
+    </p:tnLst>
+  </p:timing>
+</p:sld>
+</file>
+
+<file path=ppt/slides/slide11.xml><?xml version="1.0" encoding="utf-8"?>
+<p:sld xmlns:a="http://schemas.openxmlformats.org/drawingml/2006/main" xmlns:r="http://schemas.openxmlformats.org/officeDocument/2006/relationships" xmlns:p="http://schemas.openxmlformats.org/presentationml/2006/main">
+  <p:cSld>
+    <p:spTree>
+      <p:nvGrpSpPr>
+        <p:cNvPr id="1" name=""/>
+        <p:cNvGrpSpPr/>
+        <p:nvPr/>
+      </p:nvGrpSpPr>
+      <p:grpSpPr>
+        <a:xfrm>
+          <a:off x="0" y="0"/>
+          <a:ext cx="0" cy="0"/>
+          <a:chOff x="0" y="0"/>
+          <a:chExt cx="0" cy="0"/>
+        </a:xfrm>
+      </p:grpSpPr>
+      <p:pic>
+        <p:nvPicPr>
+          <p:cNvPr id="6" name="Picture 5"/>
+          <p:cNvPicPr>
+            <a:picLocks noChangeAspect="1"/>
+          </p:cNvPicPr>
+          <p:nvPr/>
+        </p:nvPicPr>
+        <p:blipFill>
+          <a:blip r:embed="rId3"/>
+          <a:stretch>
+            <a:fillRect/>
+          </a:stretch>
+        </p:blipFill>
+        <p:spPr>
+          <a:xfrm>
+            <a:off x="257402" y="899672"/>
+            <a:ext cx="8787294" cy="5054565"/>
+          </a:xfrm>
+          <a:prstGeom prst="rect">
+            <a:avLst/>
+          </a:prstGeom>
+        </p:spPr>
+      </p:pic>
+      <p:pic>
+        <p:nvPicPr>
+          <p:cNvPr id="4" name="Picture 3"/>
+          <p:cNvPicPr>
+            <a:picLocks noChangeAspect="1"/>
+          </p:cNvPicPr>
+          <p:nvPr/>
+        </p:nvPicPr>
+        <p:blipFill>
+          <a:blip r:embed="rId4"/>
+          <a:stretch>
+            <a:fillRect/>
+          </a:stretch>
+        </p:blipFill>
+        <p:spPr>
+          <a:xfrm>
+            <a:off x="745061" y="1291665"/>
+            <a:ext cx="3927602" cy="2068223"/>
+          </a:xfrm>
+          <a:prstGeom prst="rect">
+            <a:avLst/>
+          </a:prstGeom>
+        </p:spPr>
+      </p:pic>
+    </p:spTree>
+    <p:extLst>
+      <p:ext uri="{BB962C8B-B14F-4D97-AF65-F5344CB8AC3E}">
+        <p14:creationId xmlns:p14="http://schemas.microsoft.com/office/powerpoint/2010/main" val="1809429551"/>
+      </p:ext>
+    </p:extLst>
+  </p:cSld>
+  <p:clrMapOvr>
+    <a:masterClrMapping/>
+  </p:clrMapOvr>
+  <p:timing>
+    <p:tnLst>
+      <p:par>
+        <p:cTn id="1" dur="indefinite" restart="never" nodeType="tmRoot"/>
+      </p:par>
+    </p:tnLst>
+  </p:timing>
+</p:sld>
+</file>
+
+<file path=ppt/slides/slide12.xml><?xml version="1.0" encoding="utf-8"?>
+<p:sld xmlns:a="http://schemas.openxmlformats.org/drawingml/2006/main" xmlns:r="http://schemas.openxmlformats.org/officeDocument/2006/relationships" xmlns:p="http://schemas.openxmlformats.org/presentationml/2006/main">
+  <p:cSld>
+    <p:spTree>
+      <p:nvGrpSpPr>
+        <p:cNvPr id="1" name=""/>
+        <p:cNvGrpSpPr/>
+        <p:nvPr/>
+      </p:nvGrpSpPr>
+      <p:grpSpPr>
+        <a:xfrm>
+          <a:off x="0" y="0"/>
+          <a:ext cx="0" cy="0"/>
+          <a:chOff x="0" y="0"/>
+          <a:chExt cx="0" cy="0"/>
+        </a:xfrm>
+      </p:grpSpPr>
+      <p:pic>
+        <p:nvPicPr>
+          <p:cNvPr id="5" name="Picture 4"/>
+          <p:cNvPicPr>
+            <a:picLocks noChangeAspect="1"/>
+          </p:cNvPicPr>
+          <p:nvPr/>
+        </p:nvPicPr>
+        <p:blipFill>
+          <a:blip r:embed="rId2"/>
+          <a:stretch>
+            <a:fillRect/>
+          </a:stretch>
+        </p:blipFill>
+        <p:spPr>
+          <a:xfrm>
+            <a:off x="397839" y="839501"/>
+            <a:ext cx="8637832" cy="5050936"/>
+          </a:xfrm>
+          <a:prstGeom prst="rect">
+            <a:avLst/>
+          </a:prstGeom>
+        </p:spPr>
+      </p:pic>
+      <p:pic>
+        <p:nvPicPr>
+          <p:cNvPr id="6" name="Picture 5"/>
+          <p:cNvPicPr>
+            <a:picLocks noChangeAspect="1"/>
+          </p:cNvPicPr>
+          <p:nvPr/>
+        </p:nvPicPr>
+        <p:blipFill>
+          <a:blip r:embed="rId3"/>
+          <a:stretch>
+            <a:fillRect/>
+          </a:stretch>
+        </p:blipFill>
+        <p:spPr>
+          <a:xfrm>
+            <a:off x="792058" y="1272796"/>
+            <a:ext cx="3604572" cy="2270957"/>
+          </a:xfrm>
+          <a:prstGeom prst="rect">
+            <a:avLst/>
+          </a:prstGeom>
+        </p:spPr>
+      </p:pic>
+    </p:spTree>
+    <p:extLst>
+      <p:ext uri="{BB962C8B-B14F-4D97-AF65-F5344CB8AC3E}">
+        <p14:creationId xmlns:p14="http://schemas.microsoft.com/office/powerpoint/2010/main" val="2558298663"/>
+      </p:ext>
+    </p:extLst>
+  </p:cSld>
+  <p:clrMapOvr>
+    <a:masterClrMapping/>
+  </p:clrMapOvr>
+  <p:timing>
+    <p:tnLst>
+      <p:par>
+        <p:cTn id="1" dur="indefinite" restart="never" nodeType="tmRoot"/>
+      </p:par>
+    </p:tnLst>
+  </p:timing>
+</p:sld>
+</file>
+
+<file path=ppt/slides/slide13.xml><?xml version="1.0" encoding="utf-8"?>
+<p:sld xmlns:a="http://schemas.openxmlformats.org/drawingml/2006/main" xmlns:r="http://schemas.openxmlformats.org/officeDocument/2006/relationships" xmlns:p="http://schemas.openxmlformats.org/presentationml/2006/main">
+  <p:cSld>
+    <p:spTree>
+      <p:nvGrpSpPr>
+        <p:cNvPr id="1" name=""/>
+        <p:cNvGrpSpPr/>
+        <p:nvPr/>
+      </p:nvGrpSpPr>
+      <p:grpSpPr>
+        <a:xfrm>
+          <a:off x="0" y="0"/>
+          <a:ext cx="0" cy="0"/>
+          <a:chOff x="0" y="0"/>
+          <a:chExt cx="0" cy="0"/>
+        </a:xfrm>
+      </p:grpSpPr>
+      <p:pic>
+        <p:nvPicPr>
+          <p:cNvPr id="4" name="Picture 3"/>
+          <p:cNvPicPr>
+            <a:picLocks noChangeAspect="1"/>
+          </p:cNvPicPr>
+          <p:nvPr/>
+        </p:nvPicPr>
+        <p:blipFill>
+          <a:blip r:embed="rId2"/>
+          <a:stretch>
+            <a:fillRect/>
+          </a:stretch>
+        </p:blipFill>
+        <p:spPr>
+          <a:xfrm>
+            <a:off x="409965" y="551916"/>
+            <a:ext cx="8306440" cy="5434214"/>
+          </a:xfrm>
+          <a:prstGeom prst="rect">
+            <a:avLst/>
+          </a:prstGeom>
+        </p:spPr>
+      </p:pic>
+    </p:spTree>
+    <p:extLst>
+      <p:ext uri="{BB962C8B-B14F-4D97-AF65-F5344CB8AC3E}">
+        <p14:creationId xmlns:p14="http://schemas.microsoft.com/office/powerpoint/2010/main" val="239129508"/>
+      </p:ext>
+    </p:extLst>
+  </p:cSld>
+  <p:clrMapOvr>
+    <a:masterClrMapping/>
+  </p:clrMapOvr>
+  <p:timing>
+    <p:tnLst>
+      <p:par>
+        <p:cTn id="1" dur="indefinite" restart="never" nodeType="tmRoot"/>
+      </p:par>
+    </p:tnLst>
+  </p:timing>
+</p:sld>
+</file>
+
+<file path=ppt/slides/slide14.xml><?xml version="1.0" encoding="utf-8"?>
+<p:sld xmlns:a="http://schemas.openxmlformats.org/drawingml/2006/main" xmlns:r="http://schemas.openxmlformats.org/officeDocument/2006/relationships" xmlns:p="http://schemas.openxmlformats.org/presentationml/2006/main">
+  <p:cSld>
+    <p:spTree>
+      <p:nvGrpSpPr>
+        <p:cNvPr id="1" name=""/>
+        <p:cNvGrpSpPr/>
+        <p:nvPr/>
+      </p:nvGrpSpPr>
+      <p:grpSpPr>
+        <a:xfrm>
+          <a:off x="0" y="0"/>
+          <a:ext cx="0" cy="0"/>
+          <a:chOff x="0" y="0"/>
+          <a:chExt cx="0" cy="0"/>
+        </a:xfrm>
+      </p:grpSpPr>
+      <p:sp>
+        <p:nvSpPr>
+          <p:cNvPr id="2" name="Title 1"/>
+          <p:cNvSpPr>
+            <a:spLocks noGrp="1"/>
+          </p:cNvSpPr>
+          <p:nvPr>
+            <p:ph type="title"/>
+          </p:nvPr>
+        </p:nvSpPr>
+        <p:spPr/>
+        <p:txBody>
+          <a:bodyPr/>
+          <a:lstStyle/>
+          <a:p>
+            <a:r>
+              <a:rPr lang="en-US" altLang="zh-CN" dirty="0" smtClean="0"/>
+              <a:t>Conclusion and future work</a:t>
+            </a:r>
+            <a:endParaRPr lang="en-US" dirty="0"/>
+          </a:p>
+        </p:txBody>
+      </p:sp>
+      <p:sp>
+        <p:nvSpPr>
+          <p:cNvPr id="3" name="Content Placeholder 2"/>
+          <p:cNvSpPr>
+            <a:spLocks noGrp="1"/>
+          </p:cNvSpPr>
+          <p:nvPr>
+            <p:ph idx="1"/>
+          </p:nvPr>
+        </p:nvSpPr>
+        <p:spPr/>
+        <p:txBody>
+          <a:bodyPr/>
+          <a:lstStyle/>
+          <a:p>
+            <a:r>
+              <a:rPr lang="en-US" dirty="0" smtClean="0"/>
+              <a:t>Not suitable for all situations</a:t>
+            </a:r>
+          </a:p>
+          <a:p>
+            <a:r>
+              <a:rPr lang="en-US" dirty="0" smtClean="0"/>
+              <a:t>Optimizing part 2.</a:t>
+            </a:r>
+          </a:p>
+          <a:p>
+            <a:endParaRPr lang="en-US" dirty="0"/>
+          </a:p>
+        </p:txBody>
+      </p:sp>
+    </p:spTree>
+    <p:extLst>
+      <p:ext uri="{BB962C8B-B14F-4D97-AF65-F5344CB8AC3E}">
+        <p14:creationId xmlns:p14="http://schemas.microsoft.com/office/powerpoint/2010/main" val="2099712214"/>
+      </p:ext>
+    </p:extLst>
+  </p:cSld>
+  <p:clrMapOvr>
+    <a:masterClrMapping/>
+  </p:clrMapOvr>
+  <p:timing>
+    <p:tnLst>
+      <p:par>
+        <p:cTn id="1" dur="indefinite" restart="never" nodeType="tmRoot"/>
+      </p:par>
+    </p:tnLst>
+  </p:timing>
 </p:sld>
 </file>
 
@@ -6927,7 +8073,7 @@
   <p:timing>
     <p:tnLst>
       <p:par>
-        <p:cTn xmlns:p14="http://schemas.microsoft.com/office/powerpoint/2010/main" id="1" dur="indefinite" restart="never" nodeType="tmRoot"/>
+        <p:cTn id="1" dur="indefinite" restart="never" nodeType="tmRoot"/>
       </p:par>
     </p:tnLst>
   </p:timing>
@@ -7067,6 +8213,13 @@
   <p:clrMapOvr>
     <a:masterClrMapping/>
   </p:clrMapOvr>
+  <p:timing>
+    <p:tnLst>
+      <p:par>
+        <p:cTn id="1" dur="indefinite" restart="never" nodeType="tmRoot"/>
+      </p:par>
+    </p:tnLst>
+  </p:timing>
 </p:sld>
 </file>
 
@@ -7140,6 +8293,13 @@
   <p:clrMapOvr>
     <a:masterClrMapping/>
   </p:clrMapOvr>
+  <p:timing>
+    <p:tnLst>
+      <p:par>
+        <p:cTn id="1" dur="indefinite" restart="never" nodeType="tmRoot"/>
+      </p:par>
+    </p:tnLst>
+  </p:timing>
 </p:sld>
 </file>
 
@@ -7268,7 +8428,7 @@
   <p:timing>
     <p:tnLst>
       <p:par>
-        <p:cTn xmlns:p14="http://schemas.microsoft.com/office/powerpoint/2010/main" id="1" dur="indefinite" restart="never" nodeType="tmRoot"/>
+        <p:cTn id="1" dur="indefinite" restart="never" nodeType="tmRoot"/>
       </p:par>
     </p:tnLst>
   </p:timing>
@@ -7315,60 +8475,136 @@
           </a:p>
         </p:txBody>
       </p:sp>
-      <p:sp>
-        <p:nvSpPr>
-          <p:cNvPr id="3" name="Content Placeholder 2"/>
-          <p:cNvSpPr>
-            <a:spLocks noGrp="1"/>
-          </p:cNvSpPr>
-          <p:nvPr>
-            <p:ph idx="1"/>
-          </p:nvPr>
-        </p:nvSpPr>
-        <p:spPr>
-          <a:xfrm>
-            <a:off x="457200" y="5793506"/>
-            <a:ext cx="8229600" cy="607294"/>
-          </a:xfrm>
-        </p:spPr>
-        <p:txBody>
-          <a:bodyPr>
-            <a:normAutofit lnSpcReduction="10000"/>
-          </a:bodyPr>
-          <a:lstStyle/>
-          <a:p>
-            <a:r>
-              <a:rPr lang="en-US" dirty="0" smtClean="0"/>
-              <a:t>Time complexity:   o(m)*o(n)</a:t>
-            </a:r>
-            <a:endParaRPr lang="en-US" dirty="0"/>
-          </a:p>
-        </p:txBody>
-      </p:sp>
-      <p:pic>
-        <p:nvPicPr>
-          <p:cNvPr id="7" name="Picture 6"/>
-          <p:cNvPicPr>
-            <a:picLocks noChangeAspect="1"/>
-          </p:cNvPicPr>
-          <p:nvPr/>
-        </p:nvPicPr>
-        <p:blipFill>
-          <a:blip r:embed="rId2"/>
-          <a:stretch>
-            <a:fillRect/>
-          </a:stretch>
-        </p:blipFill>
-        <p:spPr>
-          <a:xfrm>
-            <a:off x="5412858" y="2207839"/>
-            <a:ext cx="2950224" cy="3082323"/>
-          </a:xfrm>
-          <a:prstGeom prst="rect">
-            <a:avLst/>
-          </a:prstGeom>
-        </p:spPr>
-      </p:pic>
+      <mc:AlternateContent xmlns:mc="http://schemas.openxmlformats.org/markup-compatibility/2006">
+        <mc:Choice xmlns:a14="http://schemas.microsoft.com/office/drawing/2010/main" Requires="a14">
+          <p:sp>
+            <p:nvSpPr>
+              <p:cNvPr id="3" name="Content Placeholder 2"/>
+              <p:cNvSpPr>
+                <a:spLocks noGrp="1"/>
+              </p:cNvSpPr>
+              <p:nvPr>
+                <p:ph idx="1"/>
+              </p:nvPr>
+            </p:nvSpPr>
+            <p:spPr>
+              <a:xfrm>
+                <a:off x="318977" y="6032680"/>
+                <a:ext cx="8229600" cy="607294"/>
+              </a:xfrm>
+            </p:spPr>
+            <p:txBody>
+              <a:bodyPr>
+                <a:normAutofit lnSpcReduction="10000"/>
+              </a:bodyPr>
+              <a:lstStyle/>
+              <a:p>
+                <a:r>
+                  <a:rPr lang="en-US" dirty="0" smtClean="0"/>
+                  <a:t>Time complexity:   </a:t>
+                </a:r>
+                <a14:m>
+                  <m:oMath xmlns:m="http://schemas.openxmlformats.org/officeDocument/2006/math">
+                    <m:r>
+                      <a:rPr lang="en-US" i="1">
+                        <a:latin typeface="Cambria Math" panose="02040503050406030204" pitchFamily="18" charset="0"/>
+                      </a:rPr>
+                      <m:t>𝑜</m:t>
+                    </m:r>
+                    <m:r>
+                      <a:rPr lang="en-US" i="1">
+                        <a:latin typeface="Cambria Math" panose="02040503050406030204" pitchFamily="18" charset="0"/>
+                      </a:rPr>
+                      <m:t>(</m:t>
+                    </m:r>
+                    <m:r>
+                      <a:rPr lang="en-US" i="1">
+                        <a:latin typeface="Cambria Math" panose="02040503050406030204" pitchFamily="18" charset="0"/>
+                      </a:rPr>
+                      <m:t>𝑚</m:t>
+                    </m:r>
+                    <m:r>
+                      <a:rPr lang="en-US" i="1">
+                        <a:latin typeface="Cambria Math" panose="02040503050406030204" pitchFamily="18" charset="0"/>
+                      </a:rPr>
+                      <m:t>)×</m:t>
+                    </m:r>
+                    <m:r>
+                      <a:rPr lang="en-US" i="1">
+                        <a:latin typeface="Cambria Math" panose="02040503050406030204" pitchFamily="18" charset="0"/>
+                        <a:ea typeface="Cambria Math" panose="02040503050406030204" pitchFamily="18" charset="0"/>
+                      </a:rPr>
+                      <m:t>𝑜</m:t>
+                    </m:r>
+                    <m:r>
+                      <a:rPr lang="en-US" i="1">
+                        <a:latin typeface="Cambria Math" panose="02040503050406030204" pitchFamily="18" charset="0"/>
+                        <a:ea typeface="Cambria Math" panose="02040503050406030204" pitchFamily="18" charset="0"/>
+                      </a:rPr>
+                      <m:t>(</m:t>
+                    </m:r>
+                    <m:r>
+                      <a:rPr lang="en-US" i="1">
+                        <a:latin typeface="Cambria Math" panose="02040503050406030204" pitchFamily="18" charset="0"/>
+                        <a:ea typeface="Cambria Math" panose="02040503050406030204" pitchFamily="18" charset="0"/>
+                      </a:rPr>
+                      <m:t>𝑛</m:t>
+                    </m:r>
+                    <m:r>
+                      <a:rPr lang="en-US" i="1">
+                        <a:latin typeface="Cambria Math" panose="02040503050406030204" pitchFamily="18" charset="0"/>
+                        <a:ea typeface="Cambria Math" panose="02040503050406030204" pitchFamily="18" charset="0"/>
+                      </a:rPr>
+                      <m:t>)</m:t>
+                    </m:r>
+                  </m:oMath>
+                </a14:m>
+                <a:endParaRPr lang="en-US" dirty="0"/>
+              </a:p>
+              <a:p>
+                <a:endParaRPr lang="en-US" dirty="0"/>
+              </a:p>
+            </p:txBody>
+          </p:sp>
+        </mc:Choice>
+        <mc:Fallback>
+          <p:sp>
+            <p:nvSpPr>
+              <p:cNvPr id="3" name="Content Placeholder 2"/>
+              <p:cNvSpPr>
+                <a:spLocks noGrp="1" noRot="1" noChangeAspect="1" noMove="1" noResize="1" noEditPoints="1" noAdjustHandles="1" noChangeArrowheads="1" noChangeShapeType="1" noTextEdit="1"/>
+              </p:cNvSpPr>
+              <p:nvPr>
+                <p:ph idx="1"/>
+              </p:nvPr>
+            </p:nvSpPr>
+            <p:spPr>
+              <a:xfrm>
+                <a:off x="318977" y="6032680"/>
+                <a:ext cx="8229600" cy="607294"/>
+              </a:xfrm>
+              <a:blipFill>
+                <a:blip r:embed="rId3"/>
+                <a:stretch>
+                  <a:fillRect t="-13131" b="-29293"/>
+                </a:stretch>
+              </a:blipFill>
+            </p:spPr>
+            <p:txBody>
+              <a:bodyPr/>
+              <a:lstStyle/>
+              <a:p>
+                <a:r>
+                  <a:rPr lang="en-US">
+                    <a:noFill/>
+                  </a:rPr>
+                  <a:t> </a:t>
+                </a:r>
+              </a:p>
+            </p:txBody>
+          </p:sp>
+        </mc:Fallback>
+      </mc:AlternateContent>
       <p:pic>
         <p:nvPicPr>
           <p:cNvPr id="8" name="Picture 7"/>
@@ -7378,7 +8614,7 @@
           <p:nvPr/>
         </p:nvPicPr>
         <p:blipFill>
-          <a:blip r:embed="rId3"/>
+          <a:blip r:embed="rId4"/>
           <a:stretch>
             <a:fillRect/>
           </a:stretch>
@@ -7387,6 +8623,30 @@
           <a:xfrm>
             <a:off x="797519" y="1925635"/>
             <a:ext cx="4323868" cy="4064589"/>
+          </a:xfrm>
+          <a:prstGeom prst="rect">
+            <a:avLst/>
+          </a:prstGeom>
+        </p:spPr>
+      </p:pic>
+      <p:pic>
+        <p:nvPicPr>
+          <p:cNvPr id="9" name="Picture 8"/>
+          <p:cNvPicPr>
+            <a:picLocks noChangeAspect="1"/>
+          </p:cNvPicPr>
+          <p:nvPr/>
+        </p:nvPicPr>
+        <p:blipFill>
+          <a:blip r:embed="rId5"/>
+          <a:stretch>
+            <a:fillRect/>
+          </a:stretch>
+        </p:blipFill>
+        <p:spPr>
+          <a:xfrm>
+            <a:off x="5239777" y="2027602"/>
+            <a:ext cx="3447023" cy="3385652"/>
           </a:xfrm>
           <a:prstGeom prst="rect">
             <a:avLst/>
@@ -7403,6 +8663,13 @@
   <p:clrMapOvr>
     <a:masterClrMapping/>
   </p:clrMapOvr>
+  <p:timing>
+    <p:tnLst>
+      <p:par>
+        <p:cTn id="1" dur="indefinite" restart="never" nodeType="tmRoot"/>
+      </p:par>
+    </p:tnLst>
+  </p:timing>
 </p:sld>
 </file>
 
@@ -7529,6 +8796,13 @@
   <p:clrMapOvr>
     <a:masterClrMapping/>
   </p:clrMapOvr>
+  <p:timing>
+    <p:tnLst>
+      <p:par>
+        <p:cTn id="1" dur="indefinite" restart="never" nodeType="tmRoot"/>
+      </p:par>
+    </p:tnLst>
+  </p:timing>
 </p:sld>
 </file>
 
@@ -7675,6 +8949,54 @@
           </a:prstGeom>
         </p:spPr>
       </p:pic>
+      <p:pic>
+        <p:nvPicPr>
+          <p:cNvPr id="5" name="Picture 4"/>
+          <p:cNvPicPr>
+            <a:picLocks noChangeAspect="1"/>
+          </p:cNvPicPr>
+          <p:nvPr/>
+        </p:nvPicPr>
+        <p:blipFill>
+          <a:blip r:embed="rId4"/>
+          <a:stretch>
+            <a:fillRect/>
+          </a:stretch>
+        </p:blipFill>
+        <p:spPr>
+          <a:xfrm>
+            <a:off x="272390" y="1608996"/>
+            <a:ext cx="7727350" cy="5090601"/>
+          </a:xfrm>
+          <a:prstGeom prst="rect">
+            <a:avLst/>
+          </a:prstGeom>
+        </p:spPr>
+      </p:pic>
+      <p:pic>
+        <p:nvPicPr>
+          <p:cNvPr id="8" name="Picture 7"/>
+          <p:cNvPicPr>
+            <a:picLocks noChangeAspect="1"/>
+          </p:cNvPicPr>
+          <p:nvPr/>
+        </p:nvPicPr>
+        <p:blipFill>
+          <a:blip r:embed="rId5"/>
+          <a:stretch>
+            <a:fillRect/>
+          </a:stretch>
+        </p:blipFill>
+        <p:spPr>
+          <a:xfrm>
+            <a:off x="3163351" y="3812219"/>
+            <a:ext cx="4503994" cy="2667750"/>
+          </a:xfrm>
+          <a:prstGeom prst="rect">
+            <a:avLst/>
+          </a:prstGeom>
+        </p:spPr>
+      </p:pic>
     </p:spTree>
     <p:extLst>
       <p:ext uri="{BB962C8B-B14F-4D97-AF65-F5344CB8AC3E}">
@@ -7685,6 +9007,142 @@
   <p:clrMapOvr>
     <a:masterClrMapping/>
   </p:clrMapOvr>
+  <p:timing>
+    <p:tnLst>
+      <p:par>
+        <p:cTn id="1" dur="indefinite" restart="never" nodeType="tmRoot">
+          <p:childTnLst>
+            <p:seq concurrent="1" nextAc="seek">
+              <p:cTn id="2" dur="indefinite" nodeType="mainSeq">
+                <p:childTnLst>
+                  <p:par>
+                    <p:cTn id="3" fill="hold">
+                      <p:stCondLst>
+                        <p:cond delay="indefinite"/>
+                      </p:stCondLst>
+                      <p:childTnLst>
+                        <p:par>
+                          <p:cTn id="4" fill="hold">
+                            <p:stCondLst>
+                              <p:cond delay="0"/>
+                            </p:stCondLst>
+                            <p:childTnLst>
+                              <p:par>
+                                <p:cTn id="5" presetID="10" presetClass="entr" presetSubtype="0" fill="hold" nodeType="clickEffect">
+                                  <p:stCondLst>
+                                    <p:cond delay="0"/>
+                                  </p:stCondLst>
+                                  <p:childTnLst>
+                                    <p:set>
+                                      <p:cBhvr>
+                                        <p:cTn id="6" dur="1" fill="hold">
+                                          <p:stCondLst>
+                                            <p:cond delay="0"/>
+                                          </p:stCondLst>
+                                        </p:cTn>
+                                        <p:tgtEl>
+                                          <p:spTgt spid="5"/>
+                                        </p:tgtEl>
+                                        <p:attrNameLst>
+                                          <p:attrName>style.visibility</p:attrName>
+                                        </p:attrNameLst>
+                                      </p:cBhvr>
+                                      <p:to>
+                                        <p:strVal val="visible"/>
+                                      </p:to>
+                                    </p:set>
+                                    <p:animEffect transition="in" filter="fade">
+                                      <p:cBhvr>
+                                        <p:cTn id="7" dur="500"/>
+                                        <p:tgtEl>
+                                          <p:spTgt spid="5"/>
+                                        </p:tgtEl>
+                                      </p:cBhvr>
+                                    </p:animEffect>
+                                  </p:childTnLst>
+                                </p:cTn>
+                              </p:par>
+                            </p:childTnLst>
+                          </p:cTn>
+                        </p:par>
+                      </p:childTnLst>
+                    </p:cTn>
+                  </p:par>
+                  <p:par>
+                    <p:cTn id="8" fill="hold">
+                      <p:stCondLst>
+                        <p:cond delay="indefinite"/>
+                      </p:stCondLst>
+                      <p:childTnLst>
+                        <p:par>
+                          <p:cTn id="9" fill="hold">
+                            <p:stCondLst>
+                              <p:cond delay="0"/>
+                            </p:stCondLst>
+                            <p:childTnLst>
+                              <p:par>
+                                <p:cTn id="10" presetID="10" presetClass="entr" presetSubtype="0" fill="hold" nodeType="clickEffect">
+                                  <p:stCondLst>
+                                    <p:cond delay="0"/>
+                                  </p:stCondLst>
+                                  <p:childTnLst>
+                                    <p:set>
+                                      <p:cBhvr>
+                                        <p:cTn id="11" dur="1" fill="hold">
+                                          <p:stCondLst>
+                                            <p:cond delay="0"/>
+                                          </p:stCondLst>
+                                        </p:cTn>
+                                        <p:tgtEl>
+                                          <p:spTgt spid="8"/>
+                                        </p:tgtEl>
+                                        <p:attrNameLst>
+                                          <p:attrName>style.visibility</p:attrName>
+                                        </p:attrNameLst>
+                                      </p:cBhvr>
+                                      <p:to>
+                                        <p:strVal val="visible"/>
+                                      </p:to>
+                                    </p:set>
+                                    <p:animEffect transition="in" filter="fade">
+                                      <p:cBhvr>
+                                        <p:cTn id="12" dur="500"/>
+                                        <p:tgtEl>
+                                          <p:spTgt spid="8"/>
+                                        </p:tgtEl>
+                                      </p:cBhvr>
+                                    </p:animEffect>
+                                  </p:childTnLst>
+                                </p:cTn>
+                              </p:par>
+                            </p:childTnLst>
+                          </p:cTn>
+                        </p:par>
+                      </p:childTnLst>
+                    </p:cTn>
+                  </p:par>
+                </p:childTnLst>
+              </p:cTn>
+              <p:prevCondLst>
+                <p:cond evt="onPrev" delay="0">
+                  <p:tgtEl>
+                    <p:sldTgt/>
+                  </p:tgtEl>
+                </p:cond>
+              </p:prevCondLst>
+              <p:nextCondLst>
+                <p:cond evt="onNext" delay="0">
+                  <p:tgtEl>
+                    <p:sldTgt/>
+                  </p:tgtEl>
+                </p:cond>
+              </p:nextCondLst>
+            </p:seq>
+          </p:childTnLst>
+        </p:cTn>
+      </p:par>
+    </p:tnLst>
+  </p:timing>
 </p:sld>
 </file>
 
@@ -7730,174 +9188,680 @@
           </a:p>
         </p:txBody>
       </p:sp>
-      <p:sp>
-        <p:nvSpPr>
-          <p:cNvPr id="3" name="Content Placeholder 2"/>
-          <p:cNvSpPr>
-            <a:spLocks noGrp="1"/>
-          </p:cNvSpPr>
-          <p:nvPr>
-            <p:ph idx="1"/>
-          </p:nvPr>
-        </p:nvSpPr>
-        <p:spPr/>
-        <p:txBody>
-          <a:bodyPr>
-            <a:normAutofit fontScale="92500" lnSpcReduction="20000"/>
-          </a:bodyPr>
-          <a:lstStyle/>
-          <a:p>
-            <a:r>
-              <a:rPr lang="en-US" dirty="0" smtClean="0"/>
-              <a:t>Constructing </a:t>
-            </a:r>
-            <a:r>
-              <a:rPr lang="en-US" dirty="0" err="1" smtClean="0"/>
-              <a:t>quadtree</a:t>
-            </a:r>
-            <a:r>
-              <a:rPr lang="en-US" dirty="0" smtClean="0"/>
-              <a:t> data structure:</a:t>
-            </a:r>
-          </a:p>
-          <a:p>
-            <a:pPr lvl="1"/>
-            <a:r>
-              <a:rPr lang="en-US" dirty="0" smtClean="0"/>
-              <a:t> 2*l*m</a:t>
-            </a:r>
-          </a:p>
-          <a:p>
-            <a:r>
-              <a:rPr lang="en-US" dirty="0" smtClean="0"/>
-              <a:t>Determine point-in-polygon</a:t>
-            </a:r>
-          </a:p>
-          <a:p>
-            <a:pPr lvl="1"/>
-            <a:r>
-              <a:rPr lang="en-US" dirty="0" smtClean="0"/>
-              <a:t>which polygon it belongs </a:t>
-            </a:r>
-          </a:p>
-          <a:p>
-            <a:pPr lvl="2"/>
-            <a:r>
-              <a:rPr lang="en-US" dirty="0" smtClean="0"/>
-              <a:t>2*n</a:t>
-            </a:r>
-          </a:p>
-          <a:p>
-            <a:pPr lvl="1"/>
-            <a:r>
-              <a:rPr lang="en-US" dirty="0" smtClean="0"/>
-              <a:t>Determine according to grid:</a:t>
-            </a:r>
-          </a:p>
-          <a:p>
-            <a:pPr lvl="2"/>
-            <a:r>
-              <a:rPr lang="en-US" dirty="0" smtClean="0"/>
-              <a:t>Best -- n0</a:t>
-            </a:r>
-          </a:p>
-          <a:p>
-            <a:pPr lvl="2"/>
-            <a:r>
-              <a:rPr lang="en-US" dirty="0" smtClean="0"/>
-              <a:t>Worst -- n1 * </a:t>
-            </a:r>
-            <a:r>
-              <a:rPr lang="en-US" dirty="0" err="1" smtClean="0"/>
-              <a:t>logl</a:t>
-            </a:r>
-            <a:r>
-              <a:rPr lang="en-US" dirty="0" smtClean="0"/>
-              <a:t>(m)</a:t>
-            </a:r>
-          </a:p>
-          <a:p>
-            <a:r>
-              <a:rPr lang="en-US" dirty="0" smtClean="0"/>
-              <a:t>2*l*m + 2*</a:t>
-            </a:r>
-            <a:r>
-              <a:rPr lang="en-US" dirty="0" err="1" smtClean="0"/>
-              <a:t>n+n</a:t>
-            </a:r>
-            <a:r>
-              <a:rPr lang="en-US" dirty="0" smtClean="0"/>
-              <a:t>*</a:t>
-            </a:r>
-            <a:r>
-              <a:rPr lang="en-US" dirty="0" err="1" smtClean="0"/>
-              <a:t>logl</a:t>
-            </a:r>
-            <a:r>
-              <a:rPr lang="en-US" dirty="0" smtClean="0"/>
-              <a:t>(m) == 2*l*m + n*</a:t>
-            </a:r>
-            <a:r>
-              <a:rPr lang="en-US" dirty="0" err="1" smtClean="0"/>
-              <a:t>logl</a:t>
-            </a:r>
-            <a:r>
-              <a:rPr lang="en-US" dirty="0" smtClean="0"/>
-              <a:t>(m)</a:t>
-            </a:r>
-          </a:p>
-          <a:p>
-            <a:r>
-              <a:rPr lang="en-US" dirty="0"/>
-              <a:t>2*l*m + n*</a:t>
-            </a:r>
-            <a:r>
-              <a:rPr lang="en-US" dirty="0" err="1"/>
-              <a:t>logl</a:t>
-            </a:r>
-            <a:r>
-              <a:rPr lang="en-US" dirty="0"/>
-              <a:t>(m</a:t>
-            </a:r>
-            <a:r>
-              <a:rPr lang="en-US" dirty="0" smtClean="0"/>
-              <a:t>) vs. m*n</a:t>
-            </a:r>
-          </a:p>
-          <a:p>
-            <a:r>
-              <a:rPr lang="en-US" dirty="0" smtClean="0"/>
-              <a:t>2*l &lt;&lt; n</a:t>
-            </a:r>
-          </a:p>
-          <a:p>
-            <a:r>
-              <a:rPr lang="en-US" dirty="0"/>
-              <a:t>n</a:t>
-            </a:r>
-            <a:r>
-              <a:rPr lang="en-US" dirty="0" smtClean="0"/>
-              <a:t>*</a:t>
-            </a:r>
-            <a:r>
-              <a:rPr lang="en-US" dirty="0" err="1" smtClean="0"/>
-              <a:t>logl</a:t>
-            </a:r>
-            <a:r>
-              <a:rPr lang="en-US" dirty="0" smtClean="0"/>
-              <a:t>(m) vs. </a:t>
-            </a:r>
-            <a:r>
-              <a:rPr lang="en-US" smtClean="0"/>
-              <a:t>n*m</a:t>
-            </a:r>
-            <a:endParaRPr lang="en-US" dirty="0" smtClean="0"/>
-          </a:p>
-          <a:p>
-            <a:endParaRPr lang="en-US" dirty="0"/>
-          </a:p>
-        </p:txBody>
-      </p:sp>
+      <mc:AlternateContent xmlns:mc="http://schemas.openxmlformats.org/markup-compatibility/2006">
+        <mc:Choice xmlns:a14="http://schemas.microsoft.com/office/drawing/2010/main" Requires="a14">
+          <p:sp>
+            <p:nvSpPr>
+              <p:cNvPr id="3" name="Content Placeholder 2"/>
+              <p:cNvSpPr>
+                <a:spLocks noGrp="1"/>
+              </p:cNvSpPr>
+              <p:nvPr>
+                <p:ph idx="1"/>
+              </p:nvPr>
+            </p:nvSpPr>
+            <p:spPr/>
+            <p:txBody>
+              <a:bodyPr>
+                <a:normAutofit fontScale="92500" lnSpcReduction="10000"/>
+              </a:bodyPr>
+              <a:lstStyle/>
+              <a:p>
+                <a:r>
+                  <a:rPr lang="en-US" dirty="0" smtClean="0"/>
+                  <a:t>Constructing </a:t>
+                </a:r>
+                <a:r>
+                  <a:rPr lang="en-US" dirty="0" err="1" smtClean="0"/>
+                  <a:t>quadtree</a:t>
+                </a:r>
+                <a:r>
+                  <a:rPr lang="en-US" dirty="0" smtClean="0"/>
+                  <a:t> data structure:</a:t>
+                </a:r>
+              </a:p>
+              <a:p>
+                <a:pPr lvl="1"/>
+                <a:r>
+                  <a:rPr lang="en-US" dirty="0" smtClean="0"/>
+                  <a:t> </a:t>
+                </a:r>
+                <a14:m>
+                  <m:oMath xmlns:m="http://schemas.openxmlformats.org/officeDocument/2006/math">
+                    <m:r>
+                      <a:rPr lang="en-US" b="0" i="1" smtClean="0">
+                        <a:latin typeface="Cambria Math" panose="02040503050406030204" pitchFamily="18" charset="0"/>
+                      </a:rPr>
+                      <m:t>2</m:t>
+                    </m:r>
+                    <m:r>
+                      <a:rPr lang="en-US" b="0" i="1" smtClean="0">
+                        <a:latin typeface="Cambria Math" panose="02040503050406030204" pitchFamily="18" charset="0"/>
+                        <a:ea typeface="Cambria Math" panose="02040503050406030204" pitchFamily="18" charset="0"/>
+                      </a:rPr>
+                      <m:t>×</m:t>
+                    </m:r>
+                    <m:r>
+                      <a:rPr lang="en-US" b="0" i="1" smtClean="0">
+                        <a:latin typeface="Cambria Math" panose="02040503050406030204" pitchFamily="18" charset="0"/>
+                        <a:ea typeface="Cambria Math" panose="02040503050406030204" pitchFamily="18" charset="0"/>
+                      </a:rPr>
+                      <m:t>𝑙</m:t>
+                    </m:r>
+                    <m:r>
+                      <a:rPr lang="en-US" b="0" i="1" smtClean="0">
+                        <a:latin typeface="Cambria Math" panose="02040503050406030204" pitchFamily="18" charset="0"/>
+                        <a:ea typeface="Cambria Math" panose="02040503050406030204" pitchFamily="18" charset="0"/>
+                      </a:rPr>
+                      <m:t>×</m:t>
+                    </m:r>
+                    <m:r>
+                      <a:rPr lang="en-US" b="0" i="1" smtClean="0">
+                        <a:latin typeface="Cambria Math" panose="02040503050406030204" pitchFamily="18" charset="0"/>
+                        <a:ea typeface="Cambria Math" panose="02040503050406030204" pitchFamily="18" charset="0"/>
+                      </a:rPr>
+                      <m:t>𝑚</m:t>
+                    </m:r>
+                  </m:oMath>
+                </a14:m>
+                <a:endParaRPr lang="en-US" dirty="0" smtClean="0"/>
+              </a:p>
+              <a:p>
+                <a:r>
+                  <a:rPr lang="en-US" dirty="0" smtClean="0"/>
+                  <a:t>Determine point-in-polygon</a:t>
+                </a:r>
+              </a:p>
+              <a:p>
+                <a:pPr lvl="1"/>
+                <a:r>
+                  <a:rPr lang="en-US" dirty="0" smtClean="0"/>
+                  <a:t>which polygon it belongs </a:t>
+                </a:r>
+              </a:p>
+              <a:p>
+                <a:pPr lvl="2"/>
+                <a14:m>
+                  <m:oMath xmlns:m="http://schemas.openxmlformats.org/officeDocument/2006/math">
+                    <m:r>
+                      <a:rPr lang="en-US" b="0" i="1" smtClean="0">
+                        <a:latin typeface="Cambria Math" panose="02040503050406030204" pitchFamily="18" charset="0"/>
+                      </a:rPr>
+                      <m:t>2</m:t>
+                    </m:r>
+                    <m:r>
+                      <a:rPr lang="en-US" b="0" i="1" smtClean="0">
+                        <a:latin typeface="Cambria Math" panose="02040503050406030204" pitchFamily="18" charset="0"/>
+                        <a:ea typeface="Cambria Math" panose="02040503050406030204" pitchFamily="18" charset="0"/>
+                      </a:rPr>
+                      <m:t>×</m:t>
+                    </m:r>
+                    <m:r>
+                      <a:rPr lang="en-US" b="0" i="1" smtClean="0">
+                        <a:latin typeface="Cambria Math" panose="02040503050406030204" pitchFamily="18" charset="0"/>
+                        <a:ea typeface="Cambria Math" panose="02040503050406030204" pitchFamily="18" charset="0"/>
+                      </a:rPr>
+                      <m:t>𝑛</m:t>
+                    </m:r>
+                  </m:oMath>
+                </a14:m>
+                <a:endParaRPr lang="en-US" dirty="0" smtClean="0"/>
+              </a:p>
+              <a:p>
+                <a:pPr lvl="1"/>
+                <a:r>
+                  <a:rPr lang="en-US" dirty="0" smtClean="0"/>
+                  <a:t>Determine according to grid:</a:t>
+                </a:r>
+              </a:p>
+              <a:p>
+                <a:pPr lvl="2"/>
+                <a:r>
+                  <a:rPr lang="en-US" dirty="0" smtClean="0"/>
+                  <a:t>Best    </a:t>
+                </a:r>
+                <a:r>
+                  <a:rPr lang="en-US" dirty="0" smtClean="0"/>
+                  <a:t>-- </a:t>
+                </a:r>
+                <a14:m>
+                  <m:oMath xmlns:m="http://schemas.openxmlformats.org/officeDocument/2006/math">
+                    <m:sSub>
+                      <m:sSubPr>
+                        <m:ctrlPr>
+                          <a:rPr lang="en-US" b="0" i="1" smtClean="0">
+                            <a:latin typeface="Cambria Math" panose="02040503050406030204" pitchFamily="18" charset="0"/>
+                          </a:rPr>
+                        </m:ctrlPr>
+                      </m:sSubPr>
+                      <m:e>
+                        <m:r>
+                          <a:rPr lang="en-US" b="0" i="1" smtClean="0">
+                            <a:latin typeface="Cambria Math" panose="02040503050406030204" pitchFamily="18" charset="0"/>
+                          </a:rPr>
+                          <m:t>𝑛</m:t>
+                        </m:r>
+                      </m:e>
+                      <m:sub>
+                        <m:r>
+                          <a:rPr lang="en-US" b="0" i="1" smtClean="0">
+                            <a:latin typeface="Cambria Math" panose="02040503050406030204" pitchFamily="18" charset="0"/>
+                          </a:rPr>
+                          <m:t>1</m:t>
+                        </m:r>
+                      </m:sub>
+                    </m:sSub>
+                    <m:r>
+                      <a:rPr lang="en-US" b="0" i="1" smtClean="0">
+                        <a:latin typeface="Cambria Math" panose="02040503050406030204" pitchFamily="18" charset="0"/>
+                        <a:ea typeface="Cambria Math" panose="02040503050406030204" pitchFamily="18" charset="0"/>
+                      </a:rPr>
+                      <m:t>×1</m:t>
+                    </m:r>
+                  </m:oMath>
+                </a14:m>
+                <a:endParaRPr lang="en-US" dirty="0" smtClean="0"/>
+              </a:p>
+              <a:p>
+                <a:pPr lvl="2"/>
+                <a:r>
+                  <a:rPr lang="en-US" dirty="0" smtClean="0"/>
+                  <a:t>Worst --</a:t>
+                </a:r>
+                <a14:m>
+                  <m:oMath xmlns:m="http://schemas.openxmlformats.org/officeDocument/2006/math">
+                    <m:sSub>
+                      <m:sSubPr>
+                        <m:ctrlPr>
+                          <a:rPr lang="en-US" i="1">
+                            <a:latin typeface="Cambria Math" panose="02040503050406030204" pitchFamily="18" charset="0"/>
+                          </a:rPr>
+                        </m:ctrlPr>
+                      </m:sSubPr>
+                      <m:e>
+                        <m:r>
+                          <a:rPr lang="en-US" i="1">
+                            <a:latin typeface="Cambria Math" panose="02040503050406030204" pitchFamily="18" charset="0"/>
+                          </a:rPr>
+                          <m:t>𝑛</m:t>
+                        </m:r>
+                      </m:e>
+                      <m:sub>
+                        <m:r>
+                          <a:rPr lang="en-US" b="0" i="1" smtClean="0">
+                            <a:latin typeface="Cambria Math" panose="02040503050406030204" pitchFamily="18" charset="0"/>
+                          </a:rPr>
+                          <m:t>2</m:t>
+                        </m:r>
+                      </m:sub>
+                    </m:sSub>
+                    <m:r>
+                      <a:rPr lang="en-US" i="1">
+                        <a:latin typeface="Cambria Math" panose="02040503050406030204" pitchFamily="18" charset="0"/>
+                        <a:ea typeface="Cambria Math" panose="02040503050406030204" pitchFamily="18" charset="0"/>
+                      </a:rPr>
+                      <m:t>×</m:t>
+                    </m:r>
+                    <m:sSubSup>
+                      <m:sSubSupPr>
+                        <m:ctrlPr>
+                          <a:rPr lang="en-US" i="1" smtClean="0">
+                            <a:latin typeface="Cambria Math" panose="02040503050406030204" pitchFamily="18" charset="0"/>
+                            <a:ea typeface="Cambria Math" panose="02040503050406030204" pitchFamily="18" charset="0"/>
+                          </a:rPr>
+                        </m:ctrlPr>
+                      </m:sSubSupPr>
+                      <m:e>
+                        <m:r>
+                          <a:rPr lang="en-US" b="0" i="1" smtClean="0">
+                            <a:latin typeface="Cambria Math" panose="02040503050406030204" pitchFamily="18" charset="0"/>
+                            <a:ea typeface="Cambria Math" panose="02040503050406030204" pitchFamily="18" charset="0"/>
+                          </a:rPr>
+                          <m:t>𝑙𝑜𝑔</m:t>
+                        </m:r>
+                      </m:e>
+                      <m:sub>
+                        <m:r>
+                          <a:rPr lang="en-US" b="0" i="1" smtClean="0">
+                            <a:latin typeface="Cambria Math" panose="02040503050406030204" pitchFamily="18" charset="0"/>
+                            <a:ea typeface="Cambria Math" panose="02040503050406030204" pitchFamily="18" charset="0"/>
+                          </a:rPr>
+                          <m:t>𝑙</m:t>
+                        </m:r>
+                      </m:sub>
+                      <m:sup>
+                        <m:r>
+                          <a:rPr lang="en-US" b="0" i="1" smtClean="0">
+                            <a:latin typeface="Cambria Math" panose="02040503050406030204" pitchFamily="18" charset="0"/>
+                            <a:ea typeface="Cambria Math" panose="02040503050406030204" pitchFamily="18" charset="0"/>
+                          </a:rPr>
+                          <m:t>𝑚</m:t>
+                        </m:r>
+                      </m:sup>
+                    </m:sSubSup>
+                  </m:oMath>
+                </a14:m>
+                <a:endParaRPr lang="en-US" dirty="0" smtClean="0"/>
+              </a:p>
+              <a:p>
+                <a:pPr marL="438912" lvl="1" indent="-320040">
+                  <a:spcBef>
+                    <a:spcPts val="0"/>
+                  </a:spcBef>
+                  <a:buClr>
+                    <a:schemeClr val="accent1"/>
+                  </a:buClr>
+                  <a:buSzPct val="80000"/>
+                  <a:buFont typeface="Wingdings 2"/>
+                  <a:buChar char=""/>
+                </a:pPr>
+                <a14:m>
+                  <m:oMath xmlns:m="http://schemas.openxmlformats.org/officeDocument/2006/math">
+                    <m:r>
+                      <a:rPr lang="en-US" i="1">
+                        <a:latin typeface="Cambria Math" panose="02040503050406030204" pitchFamily="18" charset="0"/>
+                      </a:rPr>
+                      <m:t>2</m:t>
+                    </m:r>
+                    <m:r>
+                      <a:rPr lang="en-US" i="1">
+                        <a:latin typeface="Cambria Math" panose="02040503050406030204" pitchFamily="18" charset="0"/>
+                        <a:ea typeface="Cambria Math" panose="02040503050406030204" pitchFamily="18" charset="0"/>
+                      </a:rPr>
+                      <m:t>×</m:t>
+                    </m:r>
+                    <m:r>
+                      <a:rPr lang="en-US" i="1">
+                        <a:latin typeface="Cambria Math" panose="02040503050406030204" pitchFamily="18" charset="0"/>
+                        <a:ea typeface="Cambria Math" panose="02040503050406030204" pitchFamily="18" charset="0"/>
+                      </a:rPr>
+                      <m:t>𝑙</m:t>
+                    </m:r>
+                    <m:r>
+                      <a:rPr lang="en-US" i="1">
+                        <a:latin typeface="Cambria Math" panose="02040503050406030204" pitchFamily="18" charset="0"/>
+                        <a:ea typeface="Cambria Math" panose="02040503050406030204" pitchFamily="18" charset="0"/>
+                      </a:rPr>
+                      <m:t>×</m:t>
+                    </m:r>
+                    <m:r>
+                      <a:rPr lang="en-US" i="1">
+                        <a:latin typeface="Cambria Math" panose="02040503050406030204" pitchFamily="18" charset="0"/>
+                        <a:ea typeface="Cambria Math" panose="02040503050406030204" pitchFamily="18" charset="0"/>
+                      </a:rPr>
+                      <m:t>𝑚</m:t>
+                    </m:r>
+                  </m:oMath>
+                </a14:m>
+                <a:r>
+                  <a:rPr lang="en-US" dirty="0" smtClean="0"/>
+                  <a:t> + </a:t>
+                </a:r>
+                <a14:m>
+                  <m:oMath xmlns:m="http://schemas.openxmlformats.org/officeDocument/2006/math">
+                    <m:r>
+                      <a:rPr lang="en-US" i="1">
+                        <a:latin typeface="Cambria Math" panose="02040503050406030204" pitchFamily="18" charset="0"/>
+                      </a:rPr>
+                      <m:t>2</m:t>
+                    </m:r>
+                    <m:r>
+                      <a:rPr lang="en-US" i="1">
+                        <a:latin typeface="Cambria Math" panose="02040503050406030204" pitchFamily="18" charset="0"/>
+                        <a:ea typeface="Cambria Math" panose="02040503050406030204" pitchFamily="18" charset="0"/>
+                      </a:rPr>
+                      <m:t>×</m:t>
+                    </m:r>
+                    <m:r>
+                      <a:rPr lang="en-US" i="1">
+                        <a:latin typeface="Cambria Math" panose="02040503050406030204" pitchFamily="18" charset="0"/>
+                        <a:ea typeface="Cambria Math" panose="02040503050406030204" pitchFamily="18" charset="0"/>
+                      </a:rPr>
+                      <m:t>𝑛</m:t>
+                    </m:r>
+                    <m:r>
+                      <a:rPr lang="en-US" b="0" i="0" smtClean="0">
+                        <a:latin typeface="Cambria Math" panose="02040503050406030204" pitchFamily="18" charset="0"/>
+                        <a:ea typeface="Cambria Math" panose="02040503050406030204" pitchFamily="18" charset="0"/>
+                      </a:rPr>
+                      <m:t>+</m:t>
+                    </m:r>
+                    <m:r>
+                      <a:rPr lang="en-US" i="1">
+                        <a:latin typeface="Cambria Math" panose="02040503050406030204" pitchFamily="18" charset="0"/>
+                      </a:rPr>
+                      <m:t>𝑛</m:t>
+                    </m:r>
+                    <m:r>
+                      <a:rPr lang="en-US" i="1">
+                        <a:latin typeface="Cambria Math" panose="02040503050406030204" pitchFamily="18" charset="0"/>
+                        <a:ea typeface="Cambria Math" panose="02040503050406030204" pitchFamily="18" charset="0"/>
+                      </a:rPr>
+                      <m:t>×</m:t>
+                    </m:r>
+                    <m:sSubSup>
+                      <m:sSubSupPr>
+                        <m:ctrlPr>
+                          <a:rPr lang="en-US" i="1">
+                            <a:latin typeface="Cambria Math" panose="02040503050406030204" pitchFamily="18" charset="0"/>
+                            <a:ea typeface="Cambria Math" panose="02040503050406030204" pitchFamily="18" charset="0"/>
+                          </a:rPr>
+                        </m:ctrlPr>
+                      </m:sSubSupPr>
+                      <m:e>
+                        <m:r>
+                          <a:rPr lang="en-US" i="1">
+                            <a:latin typeface="Cambria Math" panose="02040503050406030204" pitchFamily="18" charset="0"/>
+                            <a:ea typeface="Cambria Math" panose="02040503050406030204" pitchFamily="18" charset="0"/>
+                          </a:rPr>
+                          <m:t>𝑙𝑜𝑔</m:t>
+                        </m:r>
+                      </m:e>
+                      <m:sub>
+                        <m:r>
+                          <a:rPr lang="en-US" i="1">
+                            <a:latin typeface="Cambria Math" panose="02040503050406030204" pitchFamily="18" charset="0"/>
+                            <a:ea typeface="Cambria Math" panose="02040503050406030204" pitchFamily="18" charset="0"/>
+                          </a:rPr>
+                          <m:t>𝑙</m:t>
+                        </m:r>
+                      </m:sub>
+                      <m:sup>
+                        <m:r>
+                          <a:rPr lang="en-US" i="1">
+                            <a:latin typeface="Cambria Math" panose="02040503050406030204" pitchFamily="18" charset="0"/>
+                            <a:ea typeface="Cambria Math" panose="02040503050406030204" pitchFamily="18" charset="0"/>
+                          </a:rPr>
+                          <m:t>𝑚</m:t>
+                        </m:r>
+                      </m:sup>
+                    </m:sSubSup>
+                  </m:oMath>
+                </a14:m>
+                <a:r>
+                  <a:rPr lang="en-US" dirty="0" smtClean="0">
+                    <a:ea typeface="Cambria Math" panose="02040503050406030204" pitchFamily="18" charset="0"/>
+                  </a:rPr>
+                  <a:t>  vs. </a:t>
+                </a:r>
+                <a14:m>
+                  <m:oMath xmlns:m="http://schemas.openxmlformats.org/officeDocument/2006/math">
+                    <m:r>
+                      <a:rPr lang="en-US" b="0" i="1" dirty="0" smtClean="0">
+                        <a:latin typeface="Cambria Math" panose="02040503050406030204" pitchFamily="18" charset="0"/>
+                        <a:ea typeface="Cambria Math" panose="02040503050406030204" pitchFamily="18" charset="0"/>
+                      </a:rPr>
+                      <m:t>𝑚</m:t>
+                    </m:r>
+                    <m:r>
+                      <a:rPr lang="en-US" b="0" i="1" dirty="0" smtClean="0">
+                        <a:latin typeface="Cambria Math" panose="02040503050406030204" pitchFamily="18" charset="0"/>
+                        <a:ea typeface="Cambria Math" panose="02040503050406030204" pitchFamily="18" charset="0"/>
+                      </a:rPr>
+                      <m:t>×</m:t>
+                    </m:r>
+                    <m:r>
+                      <a:rPr lang="en-US" b="0" i="1" dirty="0" smtClean="0">
+                        <a:latin typeface="Cambria Math" panose="02040503050406030204" pitchFamily="18" charset="0"/>
+                        <a:ea typeface="Cambria Math" panose="02040503050406030204" pitchFamily="18" charset="0"/>
+                      </a:rPr>
+                      <m:t>𝑛</m:t>
+                    </m:r>
+                  </m:oMath>
+                </a14:m>
+                <a:r>
+                  <a:rPr lang="en-US" dirty="0" smtClean="0">
+                    <a:ea typeface="Cambria Math" panose="02040503050406030204" pitchFamily="18" charset="0"/>
+                  </a:rPr>
+                  <a:t> </a:t>
+                </a:r>
+              </a:p>
+              <a:p>
+                <a:pPr marL="438912" lvl="1" indent="-320040">
+                  <a:spcBef>
+                    <a:spcPts val="0"/>
+                  </a:spcBef>
+                  <a:buClr>
+                    <a:schemeClr val="accent1"/>
+                  </a:buClr>
+                  <a:buSzPct val="80000"/>
+                  <a:buFont typeface="Wingdings 2"/>
+                  <a:buChar char=""/>
+                </a:pPr>
+                <a14:m>
+                  <m:oMath xmlns:m="http://schemas.openxmlformats.org/officeDocument/2006/math">
+                    <m:r>
+                      <a:rPr lang="en-US" i="1">
+                        <a:latin typeface="Cambria Math" panose="02040503050406030204" pitchFamily="18" charset="0"/>
+                      </a:rPr>
+                      <m:t>2</m:t>
+                    </m:r>
+                    <m:r>
+                      <a:rPr lang="en-US" i="1">
+                        <a:latin typeface="Cambria Math" panose="02040503050406030204" pitchFamily="18" charset="0"/>
+                        <a:ea typeface="Cambria Math" panose="02040503050406030204" pitchFamily="18" charset="0"/>
+                      </a:rPr>
+                      <m:t>×</m:t>
+                    </m:r>
+                    <m:r>
+                      <a:rPr lang="en-US" i="1">
+                        <a:latin typeface="Cambria Math" panose="02040503050406030204" pitchFamily="18" charset="0"/>
+                        <a:ea typeface="Cambria Math" panose="02040503050406030204" pitchFamily="18" charset="0"/>
+                      </a:rPr>
+                      <m:t>𝑙</m:t>
+                    </m:r>
+                    <m:r>
+                      <a:rPr lang="en-US" i="1" smtClean="0">
+                        <a:latin typeface="Cambria Math" panose="02040503050406030204" pitchFamily="18" charset="0"/>
+                        <a:ea typeface="Cambria Math" panose="02040503050406030204" pitchFamily="18" charset="0"/>
+                      </a:rPr>
+                      <m:t>≪</m:t>
+                    </m:r>
+                    <m:r>
+                      <a:rPr lang="en-US" b="0" i="1" smtClean="0">
+                        <a:latin typeface="Cambria Math" panose="02040503050406030204" pitchFamily="18" charset="0"/>
+                        <a:ea typeface="Cambria Math" panose="02040503050406030204" pitchFamily="18" charset="0"/>
+                      </a:rPr>
+                      <m:t>𝑛</m:t>
+                    </m:r>
+                  </m:oMath>
+                </a14:m>
+                <a:endParaRPr lang="en-US" dirty="0"/>
+              </a:p>
+              <a:p>
+                <a14:m>
+                  <m:oMath xmlns:m="http://schemas.openxmlformats.org/officeDocument/2006/math">
+                    <m:d>
+                      <m:dPr>
+                        <m:ctrlPr>
+                          <a:rPr lang="en-US" i="1" smtClean="0">
+                            <a:solidFill>
+                              <a:srgbClr val="FF0000"/>
+                            </a:solidFill>
+                            <a:latin typeface="Cambria Math" panose="02040503050406030204" pitchFamily="18" charset="0"/>
+                            <a:ea typeface="Cambria Math" panose="02040503050406030204" pitchFamily="18" charset="0"/>
+                          </a:rPr>
+                        </m:ctrlPr>
+                      </m:dPr>
+                      <m:e>
+                        <m:sSubSup>
+                          <m:sSubSupPr>
+                            <m:ctrlPr>
+                              <a:rPr lang="en-US" i="1">
+                                <a:solidFill>
+                                  <a:srgbClr val="FF0000"/>
+                                </a:solidFill>
+                                <a:latin typeface="Cambria Math" panose="02040503050406030204" pitchFamily="18" charset="0"/>
+                                <a:ea typeface="Cambria Math" panose="02040503050406030204" pitchFamily="18" charset="0"/>
+                              </a:rPr>
+                            </m:ctrlPr>
+                          </m:sSubSupPr>
+                          <m:e>
+                            <m:r>
+                              <a:rPr lang="en-US" i="1">
+                                <a:solidFill>
+                                  <a:srgbClr val="FF0000"/>
+                                </a:solidFill>
+                                <a:latin typeface="Cambria Math" panose="02040503050406030204" pitchFamily="18" charset="0"/>
+                                <a:ea typeface="Cambria Math" panose="02040503050406030204" pitchFamily="18" charset="0"/>
+                              </a:rPr>
+                              <m:t>𝑙𝑜𝑔</m:t>
+                            </m:r>
+                          </m:e>
+                          <m:sub>
+                            <m:r>
+                              <a:rPr lang="en-US" i="1">
+                                <a:solidFill>
+                                  <a:srgbClr val="FF0000"/>
+                                </a:solidFill>
+                                <a:latin typeface="Cambria Math" panose="02040503050406030204" pitchFamily="18" charset="0"/>
+                                <a:ea typeface="Cambria Math" panose="02040503050406030204" pitchFamily="18" charset="0"/>
+                              </a:rPr>
+                              <m:t>𝑙</m:t>
+                            </m:r>
+                          </m:sub>
+                          <m:sup>
+                            <m:r>
+                              <a:rPr lang="en-US" i="1">
+                                <a:solidFill>
+                                  <a:srgbClr val="FF0000"/>
+                                </a:solidFill>
+                                <a:latin typeface="Cambria Math" panose="02040503050406030204" pitchFamily="18" charset="0"/>
+                                <a:ea typeface="Cambria Math" panose="02040503050406030204" pitchFamily="18" charset="0"/>
+                              </a:rPr>
+                              <m:t>𝑚</m:t>
+                            </m:r>
+                          </m:sup>
+                        </m:sSubSup>
+                        <m:r>
+                          <a:rPr lang="en-US" b="0" i="1" smtClean="0">
+                            <a:solidFill>
+                              <a:srgbClr val="FF0000"/>
+                            </a:solidFill>
+                            <a:latin typeface="Cambria Math" panose="02040503050406030204" pitchFamily="18" charset="0"/>
+                            <a:ea typeface="Cambria Math" panose="02040503050406030204" pitchFamily="18" charset="0"/>
+                          </a:rPr>
+                          <m:t>+2</m:t>
+                        </m:r>
+                      </m:e>
+                    </m:d>
+                    <m:r>
+                      <a:rPr lang="en-US" i="1" smtClean="0">
+                        <a:solidFill>
+                          <a:srgbClr val="FF0000"/>
+                        </a:solidFill>
+                        <a:latin typeface="Cambria Math" panose="02040503050406030204" pitchFamily="18" charset="0"/>
+                        <a:ea typeface="Cambria Math" panose="02040503050406030204" pitchFamily="18" charset="0"/>
+                      </a:rPr>
+                      <m:t>×</m:t>
+                    </m:r>
+                    <m:r>
+                      <a:rPr lang="en-US" b="0" i="1" smtClean="0">
+                        <a:solidFill>
+                          <a:srgbClr val="FF0000"/>
+                        </a:solidFill>
+                        <a:latin typeface="Cambria Math" panose="02040503050406030204" pitchFamily="18" charset="0"/>
+                        <a:ea typeface="Cambria Math" panose="02040503050406030204" pitchFamily="18" charset="0"/>
+                      </a:rPr>
+                      <m:t>𝑛</m:t>
+                    </m:r>
+                  </m:oMath>
+                </a14:m>
+                <a:r>
+                  <a:rPr lang="en-US" dirty="0" smtClean="0">
+                    <a:solidFill>
+                      <a:srgbClr val="FF0000"/>
+                    </a:solidFill>
+                    <a:ea typeface="Cambria Math" panose="02040503050406030204" pitchFamily="18" charset="0"/>
+                  </a:rPr>
+                  <a:t>  vs</a:t>
+                </a:r>
+                <a:r>
+                  <a:rPr lang="en-US" dirty="0">
+                    <a:solidFill>
+                      <a:srgbClr val="FF0000"/>
+                    </a:solidFill>
+                    <a:ea typeface="Cambria Math" panose="02040503050406030204" pitchFamily="18" charset="0"/>
+                  </a:rPr>
+                  <a:t>. </a:t>
+                </a:r>
+                <a14:m>
+                  <m:oMath xmlns:m="http://schemas.openxmlformats.org/officeDocument/2006/math">
+                    <m:r>
+                      <a:rPr lang="en-US" i="1" dirty="0">
+                        <a:solidFill>
+                          <a:srgbClr val="FF0000"/>
+                        </a:solidFill>
+                        <a:latin typeface="Cambria Math" panose="02040503050406030204" pitchFamily="18" charset="0"/>
+                        <a:ea typeface="Cambria Math" panose="02040503050406030204" pitchFamily="18" charset="0"/>
+                      </a:rPr>
+                      <m:t>𝑚</m:t>
+                    </m:r>
+                    <m:r>
+                      <a:rPr lang="en-US" i="1" dirty="0">
+                        <a:solidFill>
+                          <a:srgbClr val="FF0000"/>
+                        </a:solidFill>
+                        <a:latin typeface="Cambria Math" panose="02040503050406030204" pitchFamily="18" charset="0"/>
+                        <a:ea typeface="Cambria Math" panose="02040503050406030204" pitchFamily="18" charset="0"/>
+                      </a:rPr>
+                      <m:t>×</m:t>
+                    </m:r>
+                    <m:r>
+                      <a:rPr lang="en-US" i="1" dirty="0">
+                        <a:solidFill>
+                          <a:srgbClr val="FF0000"/>
+                        </a:solidFill>
+                        <a:latin typeface="Cambria Math" panose="02040503050406030204" pitchFamily="18" charset="0"/>
+                        <a:ea typeface="Cambria Math" panose="02040503050406030204" pitchFamily="18" charset="0"/>
+                      </a:rPr>
+                      <m:t>𝑛</m:t>
+                    </m:r>
+                  </m:oMath>
+                </a14:m>
+                <a:endParaRPr lang="en-US" dirty="0" smtClean="0">
+                  <a:solidFill>
+                    <a:srgbClr val="FF0000"/>
+                  </a:solidFill>
+                </a:endParaRPr>
+              </a:p>
+            </p:txBody>
+          </p:sp>
+        </mc:Choice>
+        <mc:Fallback>
+          <p:sp>
+            <p:nvSpPr>
+              <p:cNvPr id="3" name="Content Placeholder 2"/>
+              <p:cNvSpPr>
+                <a:spLocks noGrp="1" noRot="1" noChangeAspect="1" noMove="1" noResize="1" noEditPoints="1" noAdjustHandles="1" noChangeArrowheads="1" noChangeShapeType="1" noTextEdit="1"/>
+              </p:cNvSpPr>
+              <p:nvPr>
+                <p:ph idx="1"/>
+              </p:nvPr>
+            </p:nvSpPr>
+            <p:spPr>
+              <a:blipFill>
+                <a:blip r:embed="rId3"/>
+                <a:stretch>
+                  <a:fillRect t="-1581" b="-2240"/>
+                </a:stretch>
+              </a:blipFill>
+            </p:spPr>
+            <p:txBody>
+              <a:bodyPr/>
+              <a:lstStyle/>
+              <a:p>
+                <a:r>
+                  <a:rPr lang="en-US">
+                    <a:noFill/>
+                  </a:rPr>
+                  <a:t> </a:t>
+                </a:r>
+              </a:p>
+            </p:txBody>
+          </p:sp>
+        </mc:Fallback>
+      </mc:AlternateContent>
     </p:spTree>
     <p:extLst>
       <p:ext uri="{BB962C8B-B14F-4D97-AF65-F5344CB8AC3E}">
@@ -7908,6 +9872,13 @@
   <p:clrMapOvr>
     <a:masterClrMapping/>
   </p:clrMapOvr>
+  <p:timing>
+    <p:tnLst>
+      <p:par>
+        <p:cTn id="1" dur="indefinite" restart="never" nodeType="tmRoot"/>
+      </p:par>
+    </p:tnLst>
+  </p:timing>
 </p:sld>
 </file>
 
@@ -8235,4 +10206,265 @@
   </a:objectDefaults>
   <a:extraClrSchemeLst/>
 </a:theme>
+</file>
+
+<file path=ppt/theme/theme2.xml><?xml version="1.0" encoding="utf-8"?>
+<a:theme xmlns:a="http://schemas.openxmlformats.org/drawingml/2006/main" name="Office Theme">
+  <a:themeElements>
+    <a:clrScheme name="Office">
+      <a:dk1>
+        <a:sysClr val="windowText" lastClr="000000"/>
+      </a:dk1>
+      <a:lt1>
+        <a:sysClr val="window" lastClr="FFFFFF"/>
+      </a:lt1>
+      <a:dk2>
+        <a:srgbClr val="44546A"/>
+      </a:dk2>
+      <a:lt2>
+        <a:srgbClr val="E7E6E6"/>
+      </a:lt2>
+      <a:accent1>
+        <a:srgbClr val="5B9BD5"/>
+      </a:accent1>
+      <a:accent2>
+        <a:srgbClr val="ED7D31"/>
+      </a:accent2>
+      <a:accent3>
+        <a:srgbClr val="A5A5A5"/>
+      </a:accent3>
+      <a:accent4>
+        <a:srgbClr val="FFC000"/>
+      </a:accent4>
+      <a:accent5>
+        <a:srgbClr val="4472C4"/>
+      </a:accent5>
+      <a:accent6>
+        <a:srgbClr val="70AD47"/>
+      </a:accent6>
+      <a:hlink>
+        <a:srgbClr val="0563C1"/>
+      </a:hlink>
+      <a:folHlink>
+        <a:srgbClr val="954F72"/>
+      </a:folHlink>
+    </a:clrScheme>
+    <a:fontScheme name="Office">
+      <a:majorFont>
+        <a:latin typeface="Calibri Light" panose="020F0302020204030204"/>
+        <a:ea typeface=""/>
+        <a:cs typeface=""/>
+        <a:font script="Jpan" typeface="游ゴシック Light"/>
+        <a:font script="Hang" typeface="맑은 고딕"/>
+        <a:font script="Hans" typeface="等线 Light"/>
+        <a:font script="Hant" typeface="新細明體"/>
+        <a:font script="Arab" typeface="Times New Roman"/>
+        <a:font script="Hebr" typeface="Times New Roman"/>
+        <a:font script="Thai" typeface="Angsana New"/>
+        <a:font script="Ethi" typeface="Nyala"/>
+        <a:font script="Beng" typeface="Vrinda"/>
+        <a:font script="Gujr" typeface="Shruti"/>
+        <a:font script="Khmr" typeface="MoolBoran"/>
+        <a:font script="Knda" typeface="Tunga"/>
+        <a:font script="Guru" typeface="Raavi"/>
+        <a:font script="Cans" typeface="Euphemia"/>
+        <a:font script="Cher" typeface="Plantagenet Cherokee"/>
+        <a:font script="Yiii" typeface="Microsoft Yi Baiti"/>
+        <a:font script="Tibt" typeface="Microsoft Himalaya"/>
+        <a:font script="Thaa" typeface="MV Boli"/>
+        <a:font script="Deva" typeface="Mangal"/>
+        <a:font script="Telu" typeface="Gautami"/>
+        <a:font script="Taml" typeface="Latha"/>
+        <a:font script="Syrc" typeface="Estrangelo Edessa"/>
+        <a:font script="Orya" typeface="Kalinga"/>
+        <a:font script="Mlym" typeface="Kartika"/>
+        <a:font script="Laoo" typeface="DokChampa"/>
+        <a:font script="Sinh" typeface="Iskoola Pota"/>
+        <a:font script="Mong" typeface="Mongolian Baiti"/>
+        <a:font script="Viet" typeface="Times New Roman"/>
+        <a:font script="Uigh" typeface="Microsoft Uighur"/>
+        <a:font script="Geor" typeface="Sylfaen"/>
+      </a:majorFont>
+      <a:minorFont>
+        <a:latin typeface="Calibri" panose="020F0502020204030204"/>
+        <a:ea typeface=""/>
+        <a:cs typeface=""/>
+        <a:font script="Jpan" typeface="游ゴシック"/>
+        <a:font script="Hang" typeface="맑은 고딕"/>
+        <a:font script="Hans" typeface="等线"/>
+        <a:font script="Hant" typeface="新細明體"/>
+        <a:font script="Arab" typeface="Arial"/>
+        <a:font script="Hebr" typeface="Arial"/>
+        <a:font script="Thai" typeface="Cordia New"/>
+        <a:font script="Ethi" typeface="Nyala"/>
+        <a:font script="Beng" typeface="Vrinda"/>
+        <a:font script="Gujr" typeface="Shruti"/>
+        <a:font script="Khmr" typeface="DaunPenh"/>
+        <a:font script="Knda" typeface="Tunga"/>
+        <a:font script="Guru" typeface="Raavi"/>
+        <a:font script="Cans" typeface="Euphemia"/>
+        <a:font script="Cher" typeface="Plantagenet Cherokee"/>
+        <a:font script="Yiii" typeface="Microsoft Yi Baiti"/>
+        <a:font script="Tibt" typeface="Microsoft Himalaya"/>
+        <a:font script="Thaa" typeface="MV Boli"/>
+        <a:font script="Deva" typeface="Mangal"/>
+        <a:font script="Telu" typeface="Gautami"/>
+        <a:font script="Taml" typeface="Latha"/>
+        <a:font script="Syrc" typeface="Estrangelo Edessa"/>
+        <a:font script="Orya" typeface="Kalinga"/>
+        <a:font script="Mlym" typeface="Kartika"/>
+        <a:font script="Laoo" typeface="DokChampa"/>
+        <a:font script="Sinh" typeface="Iskoola Pota"/>
+        <a:font script="Mong" typeface="Mongolian Baiti"/>
+        <a:font script="Viet" typeface="Arial"/>
+        <a:font script="Uigh" typeface="Microsoft Uighur"/>
+        <a:font script="Geor" typeface="Sylfaen"/>
+      </a:minorFont>
+    </a:fontScheme>
+    <a:fmtScheme name="Office">
+      <a:fillStyleLst>
+        <a:solidFill>
+          <a:schemeClr val="phClr"/>
+        </a:solidFill>
+        <a:gradFill rotWithShape="1">
+          <a:gsLst>
+            <a:gs pos="0">
+              <a:schemeClr val="phClr">
+                <a:lumMod val="110000"/>
+                <a:satMod val="105000"/>
+                <a:tint val="67000"/>
+              </a:schemeClr>
+            </a:gs>
+            <a:gs pos="50000">
+              <a:schemeClr val="phClr">
+                <a:lumMod val="105000"/>
+                <a:satMod val="103000"/>
+                <a:tint val="73000"/>
+              </a:schemeClr>
+            </a:gs>
+            <a:gs pos="100000">
+              <a:schemeClr val="phClr">
+                <a:lumMod val="105000"/>
+                <a:satMod val="109000"/>
+                <a:tint val="81000"/>
+              </a:schemeClr>
+            </a:gs>
+          </a:gsLst>
+          <a:lin ang="5400000" scaled="0"/>
+        </a:gradFill>
+        <a:gradFill rotWithShape="1">
+          <a:gsLst>
+            <a:gs pos="0">
+              <a:schemeClr val="phClr">
+                <a:satMod val="103000"/>
+                <a:lumMod val="102000"/>
+                <a:tint val="94000"/>
+              </a:schemeClr>
+            </a:gs>
+            <a:gs pos="50000">
+              <a:schemeClr val="phClr">
+                <a:satMod val="110000"/>
+                <a:lumMod val="100000"/>
+                <a:shade val="100000"/>
+              </a:schemeClr>
+            </a:gs>
+            <a:gs pos="100000">
+              <a:schemeClr val="phClr">
+                <a:lumMod val="99000"/>
+                <a:satMod val="120000"/>
+                <a:shade val="78000"/>
+              </a:schemeClr>
+            </a:gs>
+          </a:gsLst>
+          <a:lin ang="5400000" scaled="0"/>
+        </a:gradFill>
+      </a:fillStyleLst>
+      <a:lnStyleLst>
+        <a:ln w="6350" cap="flat" cmpd="sng" algn="ctr">
+          <a:solidFill>
+            <a:schemeClr val="phClr"/>
+          </a:solidFill>
+          <a:prstDash val="solid"/>
+          <a:miter lim="800000"/>
+        </a:ln>
+        <a:ln w="12700" cap="flat" cmpd="sng" algn="ctr">
+          <a:solidFill>
+            <a:schemeClr val="phClr"/>
+          </a:solidFill>
+          <a:prstDash val="solid"/>
+          <a:miter lim="800000"/>
+        </a:ln>
+        <a:ln w="19050" cap="flat" cmpd="sng" algn="ctr">
+          <a:solidFill>
+            <a:schemeClr val="phClr"/>
+          </a:solidFill>
+          <a:prstDash val="solid"/>
+          <a:miter lim="800000"/>
+        </a:ln>
+      </a:lnStyleLst>
+      <a:effectStyleLst>
+        <a:effectStyle>
+          <a:effectLst/>
+        </a:effectStyle>
+        <a:effectStyle>
+          <a:effectLst/>
+        </a:effectStyle>
+        <a:effectStyle>
+          <a:effectLst>
+            <a:outerShdw blurRad="57150" dist="19050" dir="5400000" algn="ctr" rotWithShape="0">
+              <a:srgbClr val="000000">
+                <a:alpha val="63000"/>
+              </a:srgbClr>
+            </a:outerShdw>
+          </a:effectLst>
+        </a:effectStyle>
+      </a:effectStyleLst>
+      <a:bgFillStyleLst>
+        <a:solidFill>
+          <a:schemeClr val="phClr"/>
+        </a:solidFill>
+        <a:solidFill>
+          <a:schemeClr val="phClr">
+            <a:tint val="95000"/>
+            <a:satMod val="170000"/>
+          </a:schemeClr>
+        </a:solidFill>
+        <a:gradFill rotWithShape="1">
+          <a:gsLst>
+            <a:gs pos="0">
+              <a:schemeClr val="phClr">
+                <a:tint val="93000"/>
+                <a:satMod val="150000"/>
+                <a:shade val="98000"/>
+                <a:lumMod val="102000"/>
+              </a:schemeClr>
+            </a:gs>
+            <a:gs pos="50000">
+              <a:schemeClr val="phClr">
+                <a:tint val="98000"/>
+                <a:satMod val="130000"/>
+                <a:shade val="90000"/>
+                <a:lumMod val="103000"/>
+              </a:schemeClr>
+            </a:gs>
+            <a:gs pos="100000">
+              <a:schemeClr val="phClr">
+                <a:shade val="63000"/>
+                <a:satMod val="120000"/>
+              </a:schemeClr>
+            </a:gs>
+          </a:gsLst>
+          <a:lin ang="5400000" scaled="0"/>
+        </a:gradFill>
+      </a:bgFillStyleLst>
+    </a:fmtScheme>
+  </a:themeElements>
+  <a:objectDefaults/>
+  <a:extraClrSchemeLst/>
+  <a:extLst>
+    <a:ext uri="{05A4C25C-085E-4340-85A3-A5531E510DB2}">
+      <thm15:themeFamily xmlns:thm15="http://schemas.microsoft.com/office/thememl/2012/main" name="Office Theme" id="{62F939B6-93AF-4DB8-9C6B-D6C7DFDC589F}" vid="{4A3C46E8-61CC-4603-A589-7422A47A8E4A}"/>
+    </a:ext>
+  </a:extLst>
+</a:theme>
 </file>
</xml_diff>